<commit_message>
Adds mice and keyboards.
</commit_message>
<xml_diff>
--- a/GampadPartsAndTerms.pptx
+++ b/GampadPartsAndTerms.pptx
@@ -6,6 +6,8 @@
   </p:sldMasterIdLst>
   <p:sldIdLst>
     <p:sldId id="256" r:id="rId2"/>
+    <p:sldId id="258" r:id="rId3"/>
+    <p:sldId id="259" r:id="rId4"/>
   </p:sldIdLst>
   <p:sldSz cx="12192000" cy="6858000"/>
   <p:notesSz cx="6858000" cy="9144000"/>
@@ -104,6 +106,11 @@
       </a:defRPr>
     </a:lvl9pPr>
   </p:defaultTextStyle>
+  <p:extLst>
+    <p:ext uri="{EFAFB233-063F-42B5-8137-9DF3F51BA10A}">
+      <p15:sldGuideLst xmlns:p15="http://schemas.microsoft.com/office/powerpoint/2012/main"/>
+    </p:ext>
+  </p:extLst>
 </p:presentation>
 </file>
 
@@ -3321,6 +3328,58 @@
           <a:chExt cx="0" cy="0"/>
         </a:xfrm>
       </p:grpSpPr>
+      <p:sp>
+        <p:nvSpPr>
+          <p:cNvPr id="2" name="Rectangle 1">
+            <a:extLst>
+              <a:ext uri="{FF2B5EF4-FFF2-40B4-BE49-F238E27FC236}">
+                <a16:creationId xmlns:a16="http://schemas.microsoft.com/office/drawing/2014/main" id="{5CCCBFA1-FDCD-4E57-81CE-6E0F8D7901BF}"/>
+              </a:ext>
+            </a:extLst>
+          </p:cNvPr>
+          <p:cNvSpPr/>
+          <p:nvPr/>
+        </p:nvSpPr>
+        <p:spPr>
+          <a:xfrm>
+            <a:off x="0" y="0"/>
+            <a:ext cx="12192000" cy="6858000"/>
+          </a:xfrm>
+          <a:prstGeom prst="rect">
+            <a:avLst/>
+          </a:prstGeom>
+          <a:solidFill>
+            <a:schemeClr val="bg1"/>
+          </a:solidFill>
+          <a:ln>
+            <a:noFill/>
+          </a:ln>
+        </p:spPr>
+        <p:style>
+          <a:lnRef idx="2">
+            <a:schemeClr val="accent1">
+              <a:shade val="50000"/>
+            </a:schemeClr>
+          </a:lnRef>
+          <a:fillRef idx="1">
+            <a:schemeClr val="accent1"/>
+          </a:fillRef>
+          <a:effectRef idx="0">
+            <a:schemeClr val="accent1"/>
+          </a:effectRef>
+          <a:fontRef idx="minor">
+            <a:schemeClr val="lt1"/>
+          </a:fontRef>
+        </p:style>
+        <p:txBody>
+          <a:bodyPr rtlCol="0" anchor="ctr"/>
+          <a:lstStyle/>
+          <a:p>
+            <a:pPr algn="ctr"/>
+            <a:endParaRPr lang="en-US"/>
+          </a:p>
+        </p:txBody>
+      </p:sp>
       <p:pic>
         <p:nvPicPr>
           <p:cNvPr id="1026" name="Picture 2" descr="https://i5.walmartimages.com/asr/cc1e8142-7c0c-46c6-a2b2-df30d85d199a_1.5abf59f0479abdfb3bcb3c9faab2269e.jpeg?odnWidth=undefined&amp;odnHeight=undefined&amp;odnBg=ffffff">
@@ -4549,6 +4608,3991 @@
     <p:extLst>
       <p:ext uri="{BB962C8B-B14F-4D97-AF65-F5344CB8AC3E}">
         <p14:creationId xmlns:p14="http://schemas.microsoft.com/office/powerpoint/2010/main" val="2944281412"/>
+      </p:ext>
+    </p:extLst>
+  </p:cSld>
+  <p:clrMapOvr>
+    <a:masterClrMapping/>
+  </p:clrMapOvr>
+</p:sld>
+</file>
+
+<file path=ppt/slides/slide2.xml><?xml version="1.0" encoding="utf-8"?>
+<p:sld xmlns:a="http://schemas.openxmlformats.org/drawingml/2006/main" xmlns:r="http://schemas.openxmlformats.org/officeDocument/2006/relationships" xmlns:p="http://schemas.openxmlformats.org/presentationml/2006/main">
+  <p:cSld>
+    <p:spTree>
+      <p:nvGrpSpPr>
+        <p:cNvPr id="1" name=""/>
+        <p:cNvGrpSpPr/>
+        <p:nvPr/>
+      </p:nvGrpSpPr>
+      <p:grpSpPr>
+        <a:xfrm>
+          <a:off x="0" y="0"/>
+          <a:ext cx="0" cy="0"/>
+          <a:chOff x="0" y="0"/>
+          <a:chExt cx="0" cy="0"/>
+        </a:xfrm>
+      </p:grpSpPr>
+      <p:sp>
+        <p:nvSpPr>
+          <p:cNvPr id="132" name="Rectangle 131">
+            <a:extLst>
+              <a:ext uri="{FF2B5EF4-FFF2-40B4-BE49-F238E27FC236}">
+                <a16:creationId xmlns:a16="http://schemas.microsoft.com/office/drawing/2014/main" id="{1F5A8F92-A385-4211-BF3B-D7FEB298FAE0}"/>
+              </a:ext>
+            </a:extLst>
+          </p:cNvPr>
+          <p:cNvSpPr/>
+          <p:nvPr/>
+        </p:nvSpPr>
+        <p:spPr>
+          <a:xfrm>
+            <a:off x="0" y="0"/>
+            <a:ext cx="12192000" cy="6858000"/>
+          </a:xfrm>
+          <a:prstGeom prst="rect">
+            <a:avLst/>
+          </a:prstGeom>
+          <a:solidFill>
+            <a:schemeClr val="bg1"/>
+          </a:solidFill>
+          <a:ln>
+            <a:noFill/>
+          </a:ln>
+        </p:spPr>
+        <p:style>
+          <a:lnRef idx="2">
+            <a:schemeClr val="accent1">
+              <a:shade val="50000"/>
+            </a:schemeClr>
+          </a:lnRef>
+          <a:fillRef idx="1">
+            <a:schemeClr val="accent1"/>
+          </a:fillRef>
+          <a:effectRef idx="0">
+            <a:schemeClr val="accent1"/>
+          </a:effectRef>
+          <a:fontRef idx="minor">
+            <a:schemeClr val="lt1"/>
+          </a:fontRef>
+        </p:style>
+        <p:txBody>
+          <a:bodyPr rtlCol="0" anchor="ctr"/>
+          <a:lstStyle/>
+          <a:p>
+            <a:pPr algn="ctr"/>
+            <a:endParaRPr lang="en-US"/>
+          </a:p>
+        </p:txBody>
+      </p:sp>
+      <p:cxnSp>
+        <p:nvCxnSpPr>
+          <p:cNvPr id="5" name="Straight Connector 4">
+            <a:extLst>
+              <a:ext uri="{FF2B5EF4-FFF2-40B4-BE49-F238E27FC236}">
+                <a16:creationId xmlns:a16="http://schemas.microsoft.com/office/drawing/2014/main" id="{137595DA-6D53-45A0-9254-830836053E7D}"/>
+              </a:ext>
+            </a:extLst>
+          </p:cNvPr>
+          <p:cNvCxnSpPr>
+            <a:cxnSpLocks/>
+          </p:cNvCxnSpPr>
+          <p:nvPr/>
+        </p:nvCxnSpPr>
+        <p:spPr>
+          <a:xfrm flipV="1">
+            <a:off x="509125" y="1854805"/>
+            <a:ext cx="2396815" cy="13201"/>
+          </a:xfrm>
+          <a:prstGeom prst="line">
+            <a:avLst/>
+          </a:prstGeom>
+          <a:ln cap="rnd"/>
+        </p:spPr>
+        <p:style>
+          <a:lnRef idx="3">
+            <a:schemeClr val="accent6"/>
+          </a:lnRef>
+          <a:fillRef idx="0">
+            <a:schemeClr val="accent6"/>
+          </a:fillRef>
+          <a:effectRef idx="2">
+            <a:schemeClr val="accent6"/>
+          </a:effectRef>
+          <a:fontRef idx="minor">
+            <a:schemeClr val="tx1"/>
+          </a:fontRef>
+        </p:style>
+      </p:cxnSp>
+      <p:sp>
+        <p:nvSpPr>
+          <p:cNvPr id="11" name="Oval 10">
+            <a:extLst>
+              <a:ext uri="{FF2B5EF4-FFF2-40B4-BE49-F238E27FC236}">
+                <a16:creationId xmlns:a16="http://schemas.microsoft.com/office/drawing/2014/main" id="{B8162159-F990-4B83-B1ED-B71983DC26AC}"/>
+              </a:ext>
+            </a:extLst>
+          </p:cNvPr>
+          <p:cNvSpPr/>
+          <p:nvPr/>
+        </p:nvSpPr>
+        <p:spPr>
+          <a:xfrm>
+            <a:off x="2858314" y="1788130"/>
+            <a:ext cx="133350" cy="133350"/>
+          </a:xfrm>
+          <a:prstGeom prst="ellipse">
+            <a:avLst/>
+          </a:prstGeom>
+        </p:spPr>
+        <p:style>
+          <a:lnRef idx="2">
+            <a:schemeClr val="accent6"/>
+          </a:lnRef>
+          <a:fillRef idx="1">
+            <a:schemeClr val="lt1"/>
+          </a:fillRef>
+          <a:effectRef idx="0">
+            <a:schemeClr val="accent6"/>
+          </a:effectRef>
+          <a:fontRef idx="minor">
+            <a:schemeClr val="dk1"/>
+          </a:fontRef>
+        </p:style>
+        <p:txBody>
+          <a:bodyPr rtlCol="0" anchor="ctr"/>
+          <a:lstStyle/>
+          <a:p>
+            <a:pPr algn="ctr"/>
+            <a:endParaRPr lang="en-US"/>
+          </a:p>
+        </p:txBody>
+      </p:sp>
+      <p:sp>
+        <p:nvSpPr>
+          <p:cNvPr id="12" name="TextBox 11">
+            <a:extLst>
+              <a:ext uri="{FF2B5EF4-FFF2-40B4-BE49-F238E27FC236}">
+                <a16:creationId xmlns:a16="http://schemas.microsoft.com/office/drawing/2014/main" id="{2F21B15B-18F0-404B-A4D9-CF02D6672999}"/>
+              </a:ext>
+            </a:extLst>
+          </p:cNvPr>
+          <p:cNvSpPr txBox="1"/>
+          <p:nvPr/>
+        </p:nvSpPr>
+        <p:spPr>
+          <a:xfrm>
+            <a:off x="423401" y="1498674"/>
+            <a:ext cx="2482539" cy="369332"/>
+          </a:xfrm>
+          <a:prstGeom prst="rect">
+            <a:avLst/>
+          </a:prstGeom>
+          <a:noFill/>
+        </p:spPr>
+        <p:txBody>
+          <a:bodyPr wrap="none" rtlCol="0">
+            <a:spAutoFit/>
+          </a:bodyPr>
+          <a:lstStyle/>
+          <a:p>
+            <a:r>
+              <a:rPr lang="en-US" dirty="0" err="1">
+                <a:solidFill>
+                  <a:schemeClr val="accent6">
+                    <a:lumMod val="75000"/>
+                  </a:schemeClr>
+                </a:solidFill>
+              </a:rPr>
+              <a:t>onKey</a:t>
+            </a:r>
+            <a:r>
+              <a:rPr lang="en-US" dirty="0">
+                <a:solidFill>
+                  <a:schemeClr val="accent6">
+                    <a:lumMod val="75000"/>
+                  </a:schemeClr>
+                </a:solidFill>
+              </a:rPr>
+              <a:t>[Down/Up](event)</a:t>
+            </a:r>
+          </a:p>
+        </p:txBody>
+      </p:sp>
+      <p:sp>
+        <p:nvSpPr>
+          <p:cNvPr id="13" name="TextBox 12">
+            <a:extLst>
+              <a:ext uri="{FF2B5EF4-FFF2-40B4-BE49-F238E27FC236}">
+                <a16:creationId xmlns:a16="http://schemas.microsoft.com/office/drawing/2014/main" id="{EEE27833-6AE7-4490-ACA8-634D7BF527E7}"/>
+              </a:ext>
+            </a:extLst>
+          </p:cNvPr>
+          <p:cNvSpPr txBox="1"/>
+          <p:nvPr/>
+        </p:nvSpPr>
+        <p:spPr>
+          <a:xfrm>
+            <a:off x="423401" y="1936567"/>
+            <a:ext cx="1588127" cy="3400931"/>
+          </a:xfrm>
+          <a:prstGeom prst="rect">
+            <a:avLst/>
+          </a:prstGeom>
+          <a:noFill/>
+        </p:spPr>
+        <p:txBody>
+          <a:bodyPr wrap="none" rtlCol="0">
+            <a:spAutoFit/>
+          </a:bodyPr>
+          <a:lstStyle/>
+          <a:p>
+            <a:r>
+              <a:rPr lang="en-US" dirty="0" err="1"/>
+              <a:t>event.key</a:t>
+            </a:r>
+            <a:endParaRPr lang="en-US" dirty="0"/>
+          </a:p>
+          <a:p>
+            <a:r>
+              <a:rPr lang="en-US" sz="1200" dirty="0" err="1">
+                <a:solidFill>
+                  <a:schemeClr val="bg1">
+                    <a:lumMod val="50000"/>
+                  </a:schemeClr>
+                </a:solidFill>
+              </a:rPr>
+              <a:t>KeyboardEvent.key</a:t>
+            </a:r>
+            <a:endParaRPr lang="en-US" sz="1200" dirty="0">
+              <a:solidFill>
+                <a:schemeClr val="bg1">
+                  <a:lumMod val="50000"/>
+                </a:schemeClr>
+              </a:solidFill>
+            </a:endParaRPr>
+          </a:p>
+          <a:p>
+            <a:endParaRPr lang="en-US" sz="600" dirty="0">
+              <a:solidFill>
+                <a:schemeClr val="bg1">
+                  <a:lumMod val="50000"/>
+                </a:schemeClr>
+              </a:solidFill>
+            </a:endParaRPr>
+          </a:p>
+          <a:p>
+            <a:r>
+              <a:rPr lang="en-US" dirty="0" err="1"/>
+              <a:t>event.ctrlKey</a:t>
+            </a:r>
+            <a:r>
+              <a:rPr lang="en-US" dirty="0"/>
+              <a:t> </a:t>
+            </a:r>
+          </a:p>
+          <a:p>
+            <a:r>
+              <a:rPr lang="en-US" sz="1200" dirty="0" err="1">
+                <a:solidFill>
+                  <a:schemeClr val="bg1">
+                    <a:lumMod val="50000"/>
+                  </a:schemeClr>
+                </a:solidFill>
+              </a:rPr>
+              <a:t>boolean</a:t>
+            </a:r>
+            <a:endParaRPr lang="en-US" sz="1200" dirty="0">
+              <a:solidFill>
+                <a:schemeClr val="bg1">
+                  <a:lumMod val="50000"/>
+                </a:schemeClr>
+              </a:solidFill>
+            </a:endParaRPr>
+          </a:p>
+          <a:p>
+            <a:endParaRPr lang="en-US" sz="600" dirty="0">
+              <a:solidFill>
+                <a:schemeClr val="bg1">
+                  <a:lumMod val="50000"/>
+                </a:schemeClr>
+              </a:solidFill>
+            </a:endParaRPr>
+          </a:p>
+          <a:p>
+            <a:r>
+              <a:rPr lang="en-US" dirty="0" err="1"/>
+              <a:t>event.shiftKey</a:t>
+            </a:r>
+            <a:endParaRPr lang="en-US" dirty="0"/>
+          </a:p>
+          <a:p>
+            <a:pPr lvl="0"/>
+            <a:r>
+              <a:rPr lang="en-US" sz="1200" dirty="0" err="1">
+                <a:solidFill>
+                  <a:prstClr val="white">
+                    <a:lumMod val="50000"/>
+                  </a:prstClr>
+                </a:solidFill>
+              </a:rPr>
+              <a:t>boolean</a:t>
+            </a:r>
+            <a:endParaRPr lang="en-US" sz="1200" dirty="0">
+              <a:solidFill>
+                <a:prstClr val="white">
+                  <a:lumMod val="50000"/>
+                </a:prstClr>
+              </a:solidFill>
+            </a:endParaRPr>
+          </a:p>
+          <a:p>
+            <a:r>
+              <a:rPr lang="en-US" sz="600" dirty="0"/>
+              <a:t> </a:t>
+            </a:r>
+          </a:p>
+          <a:p>
+            <a:r>
+              <a:rPr lang="en-US" dirty="0" err="1"/>
+              <a:t>event.altKey</a:t>
+            </a:r>
+            <a:r>
+              <a:rPr lang="en-US" dirty="0"/>
+              <a:t> </a:t>
+            </a:r>
+          </a:p>
+          <a:p>
+            <a:pPr lvl="0"/>
+            <a:r>
+              <a:rPr lang="en-US" sz="1200" dirty="0" err="1">
+                <a:solidFill>
+                  <a:prstClr val="white">
+                    <a:lumMod val="50000"/>
+                  </a:prstClr>
+                </a:solidFill>
+              </a:rPr>
+              <a:t>boolean</a:t>
+            </a:r>
+            <a:endParaRPr lang="en-US" sz="1200" dirty="0">
+              <a:solidFill>
+                <a:prstClr val="white">
+                  <a:lumMod val="50000"/>
+                </a:prstClr>
+              </a:solidFill>
+            </a:endParaRPr>
+          </a:p>
+          <a:p>
+            <a:endParaRPr lang="en-US" sz="600" dirty="0"/>
+          </a:p>
+          <a:p>
+            <a:r>
+              <a:rPr lang="en-US" dirty="0" err="1"/>
+              <a:t>event.metaKey</a:t>
+            </a:r>
+            <a:endParaRPr lang="en-US" dirty="0"/>
+          </a:p>
+          <a:p>
+            <a:pPr lvl="0"/>
+            <a:r>
+              <a:rPr lang="en-US" sz="1200" dirty="0" err="1">
+                <a:solidFill>
+                  <a:prstClr val="white">
+                    <a:lumMod val="50000"/>
+                  </a:prstClr>
+                </a:solidFill>
+              </a:rPr>
+              <a:t>boolean</a:t>
+            </a:r>
+            <a:endParaRPr lang="en-US" sz="1200" dirty="0">
+              <a:solidFill>
+                <a:prstClr val="white">
+                  <a:lumMod val="50000"/>
+                </a:prstClr>
+              </a:solidFill>
+            </a:endParaRPr>
+          </a:p>
+          <a:p>
+            <a:endParaRPr lang="en-US" dirty="0"/>
+          </a:p>
+          <a:p>
+            <a:endParaRPr lang="en-US" dirty="0"/>
+          </a:p>
+        </p:txBody>
+      </p:sp>
+      <p:sp>
+        <p:nvSpPr>
+          <p:cNvPr id="38" name="TextBox 37">
+            <a:extLst>
+              <a:ext uri="{FF2B5EF4-FFF2-40B4-BE49-F238E27FC236}">
+                <a16:creationId xmlns:a16="http://schemas.microsoft.com/office/drawing/2014/main" id="{91D2CAB9-EF2E-4B5B-B20A-806B6DD60F42}"/>
+              </a:ext>
+            </a:extLst>
+          </p:cNvPr>
+          <p:cNvSpPr txBox="1"/>
+          <p:nvPr/>
+        </p:nvSpPr>
+        <p:spPr>
+          <a:xfrm>
+            <a:off x="0" y="250222"/>
+            <a:ext cx="12192000" cy="523220"/>
+          </a:xfrm>
+          <a:prstGeom prst="rect">
+            <a:avLst/>
+          </a:prstGeom>
+          <a:noFill/>
+        </p:spPr>
+        <p:txBody>
+          <a:bodyPr wrap="square" rtlCol="0">
+            <a:spAutoFit/>
+          </a:bodyPr>
+          <a:lstStyle/>
+          <a:p>
+            <a:pPr algn="ctr"/>
+            <a:r>
+              <a:rPr lang="en-US" sz="2800" dirty="0">
+                <a:solidFill>
+                  <a:schemeClr val="accent6">
+                    <a:lumMod val="75000"/>
+                  </a:schemeClr>
+                </a:solidFill>
+              </a:rPr>
+              <a:t>Keyboards in </a:t>
+            </a:r>
+            <a:r>
+              <a:rPr lang="en-US" sz="2800" dirty="0" err="1">
+                <a:solidFill>
+                  <a:schemeClr val="accent6">
+                    <a:lumMod val="75000"/>
+                  </a:schemeClr>
+                </a:solidFill>
+              </a:rPr>
+              <a:t>Javascript</a:t>
+            </a:r>
+            <a:endParaRPr lang="en-US" sz="2800" dirty="0">
+              <a:solidFill>
+                <a:schemeClr val="accent6">
+                  <a:lumMod val="75000"/>
+                </a:schemeClr>
+              </a:solidFill>
+            </a:endParaRPr>
+          </a:p>
+        </p:txBody>
+      </p:sp>
+      <p:grpSp>
+        <p:nvGrpSpPr>
+          <p:cNvPr id="49" name="Group 48">
+            <a:extLst>
+              <a:ext uri="{FF2B5EF4-FFF2-40B4-BE49-F238E27FC236}">
+                <a16:creationId xmlns:a16="http://schemas.microsoft.com/office/drawing/2014/main" id="{B8CE06AF-2806-4107-95D9-AAC286CC343B}"/>
+              </a:ext>
+            </a:extLst>
+          </p:cNvPr>
+          <p:cNvGrpSpPr/>
+          <p:nvPr/>
+        </p:nvGrpSpPr>
+        <p:grpSpPr>
+          <a:xfrm>
+            <a:off x="3766877" y="629685"/>
+            <a:ext cx="4498072" cy="297874"/>
+            <a:chOff x="3971469" y="624781"/>
+            <a:chExt cx="4498072" cy="297874"/>
+          </a:xfrm>
+        </p:grpSpPr>
+        <p:cxnSp>
+          <p:nvCxnSpPr>
+            <p:cNvPr id="40" name="Straight Connector 39">
+              <a:extLst>
+                <a:ext uri="{FF2B5EF4-FFF2-40B4-BE49-F238E27FC236}">
+                  <a16:creationId xmlns:a16="http://schemas.microsoft.com/office/drawing/2014/main" id="{D6E0AC31-61D0-4CE2-AA3B-3C6978E8704A}"/>
+                </a:ext>
+              </a:extLst>
+            </p:cNvPr>
+            <p:cNvCxnSpPr/>
+            <p:nvPr/>
+          </p:nvCxnSpPr>
+          <p:spPr>
+            <a:xfrm>
+              <a:off x="5170031" y="773442"/>
+              <a:ext cx="2057400" cy="0"/>
+            </a:xfrm>
+            <a:prstGeom prst="line">
+              <a:avLst/>
+            </a:prstGeom>
+            <a:ln cap="rnd"/>
+          </p:spPr>
+          <p:style>
+            <a:lnRef idx="3">
+              <a:schemeClr val="accent6"/>
+            </a:lnRef>
+            <a:fillRef idx="0">
+              <a:schemeClr val="accent6"/>
+            </a:fillRef>
+            <a:effectRef idx="2">
+              <a:schemeClr val="accent6"/>
+            </a:effectRef>
+            <a:fontRef idx="minor">
+              <a:schemeClr val="tx1"/>
+            </a:fontRef>
+          </p:style>
+        </p:cxnSp>
+        <p:cxnSp>
+          <p:nvCxnSpPr>
+            <p:cNvPr id="41" name="Straight Connector 40">
+              <a:extLst>
+                <a:ext uri="{FF2B5EF4-FFF2-40B4-BE49-F238E27FC236}">
+                  <a16:creationId xmlns:a16="http://schemas.microsoft.com/office/drawing/2014/main" id="{B388F3BF-FB37-4435-8519-443F06647178}"/>
+                </a:ext>
+              </a:extLst>
+            </p:cNvPr>
+            <p:cNvCxnSpPr>
+              <a:cxnSpLocks/>
+            </p:cNvCxnSpPr>
+            <p:nvPr/>
+          </p:nvCxnSpPr>
+          <p:spPr>
+            <a:xfrm>
+              <a:off x="7349270" y="697242"/>
+              <a:ext cx="1027511" cy="0"/>
+            </a:xfrm>
+            <a:prstGeom prst="line">
+              <a:avLst/>
+            </a:prstGeom>
+            <a:ln cap="rnd"/>
+          </p:spPr>
+          <p:style>
+            <a:lnRef idx="3">
+              <a:schemeClr val="accent6"/>
+            </a:lnRef>
+            <a:fillRef idx="0">
+              <a:schemeClr val="accent6"/>
+            </a:fillRef>
+            <a:effectRef idx="2">
+              <a:schemeClr val="accent6"/>
+            </a:effectRef>
+            <a:fontRef idx="minor">
+              <a:schemeClr val="tx1"/>
+            </a:fontRef>
+          </p:style>
+        </p:cxnSp>
+        <p:cxnSp>
+          <p:nvCxnSpPr>
+            <p:cNvPr id="43" name="Straight Connector 42">
+              <a:extLst>
+                <a:ext uri="{FF2B5EF4-FFF2-40B4-BE49-F238E27FC236}">
+                  <a16:creationId xmlns:a16="http://schemas.microsoft.com/office/drawing/2014/main" id="{EC5F7052-9710-4CD3-8A81-EEE0E9A7244C}"/>
+                </a:ext>
+              </a:extLst>
+            </p:cNvPr>
+            <p:cNvCxnSpPr>
+              <a:cxnSpLocks/>
+            </p:cNvCxnSpPr>
+            <p:nvPr/>
+          </p:nvCxnSpPr>
+          <p:spPr>
+            <a:xfrm flipV="1">
+              <a:off x="7227431" y="697242"/>
+              <a:ext cx="121839" cy="76200"/>
+            </a:xfrm>
+            <a:prstGeom prst="line">
+              <a:avLst/>
+            </a:prstGeom>
+            <a:ln cap="rnd"/>
+          </p:spPr>
+          <p:style>
+            <a:lnRef idx="3">
+              <a:schemeClr val="accent6"/>
+            </a:lnRef>
+            <a:fillRef idx="0">
+              <a:schemeClr val="accent6"/>
+            </a:fillRef>
+            <a:effectRef idx="2">
+              <a:schemeClr val="accent6"/>
+            </a:effectRef>
+            <a:fontRef idx="minor">
+              <a:schemeClr val="tx1"/>
+            </a:fontRef>
+          </p:style>
+        </p:cxnSp>
+        <p:cxnSp>
+          <p:nvCxnSpPr>
+            <p:cNvPr id="46" name="Straight Connector 45">
+              <a:extLst>
+                <a:ext uri="{FF2B5EF4-FFF2-40B4-BE49-F238E27FC236}">
+                  <a16:creationId xmlns:a16="http://schemas.microsoft.com/office/drawing/2014/main" id="{C86B609C-3E9D-4EA1-9D7B-7AD108C8C57B}"/>
+                </a:ext>
+              </a:extLst>
+            </p:cNvPr>
+            <p:cNvCxnSpPr>
+              <a:cxnSpLocks/>
+            </p:cNvCxnSpPr>
+            <p:nvPr/>
+          </p:nvCxnSpPr>
+          <p:spPr>
+            <a:xfrm flipV="1">
+              <a:off x="5048192" y="773442"/>
+              <a:ext cx="121839" cy="76200"/>
+            </a:xfrm>
+            <a:prstGeom prst="line">
+              <a:avLst/>
+            </a:prstGeom>
+            <a:ln cap="rnd"/>
+          </p:spPr>
+          <p:style>
+            <a:lnRef idx="3">
+              <a:schemeClr val="accent6"/>
+            </a:lnRef>
+            <a:fillRef idx="0">
+              <a:schemeClr val="accent6"/>
+            </a:fillRef>
+            <a:effectRef idx="2">
+              <a:schemeClr val="accent6"/>
+            </a:effectRef>
+            <a:fontRef idx="minor">
+              <a:schemeClr val="tx1"/>
+            </a:fontRef>
+          </p:style>
+        </p:cxnSp>
+        <p:cxnSp>
+          <p:nvCxnSpPr>
+            <p:cNvPr id="47" name="Straight Connector 46">
+              <a:extLst>
+                <a:ext uri="{FF2B5EF4-FFF2-40B4-BE49-F238E27FC236}">
+                  <a16:creationId xmlns:a16="http://schemas.microsoft.com/office/drawing/2014/main" id="{0D690C07-0109-4CEC-B0CC-434EED608911}"/>
+                </a:ext>
+              </a:extLst>
+            </p:cNvPr>
+            <p:cNvCxnSpPr>
+              <a:cxnSpLocks/>
+            </p:cNvCxnSpPr>
+            <p:nvPr/>
+          </p:nvCxnSpPr>
+          <p:spPr>
+            <a:xfrm flipV="1">
+              <a:off x="4021655" y="849642"/>
+              <a:ext cx="1026537" cy="11668"/>
+            </a:xfrm>
+            <a:prstGeom prst="line">
+              <a:avLst/>
+            </a:prstGeom>
+            <a:ln cap="rnd"/>
+          </p:spPr>
+          <p:style>
+            <a:lnRef idx="3">
+              <a:schemeClr val="accent6"/>
+            </a:lnRef>
+            <a:fillRef idx="0">
+              <a:schemeClr val="accent6"/>
+            </a:fillRef>
+            <a:effectRef idx="2">
+              <a:schemeClr val="accent6"/>
+            </a:effectRef>
+            <a:fontRef idx="minor">
+              <a:schemeClr val="tx1"/>
+            </a:fontRef>
+          </p:style>
+        </p:cxnSp>
+        <p:sp>
+          <p:nvSpPr>
+            <p:cNvPr id="50" name="Oval 49">
+              <a:extLst>
+                <a:ext uri="{FF2B5EF4-FFF2-40B4-BE49-F238E27FC236}">
+                  <a16:creationId xmlns:a16="http://schemas.microsoft.com/office/drawing/2014/main" id="{EEA3A56A-D77B-4804-9467-3C2325189A39}"/>
+                </a:ext>
+              </a:extLst>
+            </p:cNvPr>
+            <p:cNvSpPr/>
+            <p:nvPr/>
+          </p:nvSpPr>
+          <p:spPr>
+            <a:xfrm>
+              <a:off x="3971469" y="789305"/>
+              <a:ext cx="133350" cy="133350"/>
+            </a:xfrm>
+            <a:prstGeom prst="ellipse">
+              <a:avLst/>
+            </a:prstGeom>
+          </p:spPr>
+          <p:style>
+            <a:lnRef idx="2">
+              <a:schemeClr val="accent6"/>
+            </a:lnRef>
+            <a:fillRef idx="1">
+              <a:schemeClr val="lt1"/>
+            </a:fillRef>
+            <a:effectRef idx="0">
+              <a:schemeClr val="accent6"/>
+            </a:effectRef>
+            <a:fontRef idx="minor">
+              <a:schemeClr val="dk1"/>
+            </a:fontRef>
+          </p:style>
+          <p:txBody>
+            <a:bodyPr rtlCol="0" anchor="ctr"/>
+            <a:lstStyle/>
+            <a:p>
+              <a:pPr algn="ctr"/>
+              <a:endParaRPr lang="en-US" i="1" dirty="0"/>
+            </a:p>
+          </p:txBody>
+        </p:sp>
+        <p:sp>
+          <p:nvSpPr>
+            <p:cNvPr id="51" name="Oval 50">
+              <a:extLst>
+                <a:ext uri="{FF2B5EF4-FFF2-40B4-BE49-F238E27FC236}">
+                  <a16:creationId xmlns:a16="http://schemas.microsoft.com/office/drawing/2014/main" id="{488A40C9-3C11-477D-B0FB-19648893F367}"/>
+                </a:ext>
+              </a:extLst>
+            </p:cNvPr>
+            <p:cNvSpPr/>
+            <p:nvPr/>
+          </p:nvSpPr>
+          <p:spPr>
+            <a:xfrm>
+              <a:off x="8336191" y="624781"/>
+              <a:ext cx="133350" cy="133350"/>
+            </a:xfrm>
+            <a:prstGeom prst="ellipse">
+              <a:avLst/>
+            </a:prstGeom>
+          </p:spPr>
+          <p:style>
+            <a:lnRef idx="2">
+              <a:schemeClr val="accent6"/>
+            </a:lnRef>
+            <a:fillRef idx="1">
+              <a:schemeClr val="lt1"/>
+            </a:fillRef>
+            <a:effectRef idx="0">
+              <a:schemeClr val="accent6"/>
+            </a:effectRef>
+            <a:fontRef idx="minor">
+              <a:schemeClr val="dk1"/>
+            </a:fontRef>
+          </p:style>
+          <p:txBody>
+            <a:bodyPr rtlCol="0" anchor="ctr"/>
+            <a:lstStyle/>
+            <a:p>
+              <a:pPr algn="ctr"/>
+              <a:endParaRPr lang="en-US" i="1" dirty="0"/>
+            </a:p>
+          </p:txBody>
+        </p:sp>
+      </p:grpSp>
+      <p:grpSp>
+        <p:nvGrpSpPr>
+          <p:cNvPr id="67" name="Group 66">
+            <a:extLst>
+              <a:ext uri="{FF2B5EF4-FFF2-40B4-BE49-F238E27FC236}">
+                <a16:creationId xmlns:a16="http://schemas.microsoft.com/office/drawing/2014/main" id="{085850FD-BB7C-4BCD-A810-8A4ADB6602C4}"/>
+              </a:ext>
+            </a:extLst>
+          </p:cNvPr>
+          <p:cNvGrpSpPr/>
+          <p:nvPr/>
+        </p:nvGrpSpPr>
+        <p:grpSpPr>
+          <a:xfrm>
+            <a:off x="4256420" y="2144258"/>
+            <a:ext cx="6106780" cy="3378200"/>
+            <a:chOff x="4893786" y="1918462"/>
+            <a:chExt cx="6106780" cy="3378200"/>
+          </a:xfrm>
+        </p:grpSpPr>
+        <p:pic>
+          <p:nvPicPr>
+            <p:cNvPr id="1028" name="Picture 4" descr="Image result for keyboard">
+              <a:extLst>
+                <a:ext uri="{FF2B5EF4-FFF2-40B4-BE49-F238E27FC236}">
+                  <a16:creationId xmlns:a16="http://schemas.microsoft.com/office/drawing/2014/main" id="{0EFACF13-3E59-45C2-B50E-8D12BCAA5376}"/>
+                </a:ext>
+              </a:extLst>
+            </p:cNvPr>
+            <p:cNvPicPr>
+              <a:picLocks noChangeAspect="1" noChangeArrowheads="1"/>
+            </p:cNvPicPr>
+            <p:nvPr/>
+          </p:nvPicPr>
+          <p:blipFill rotWithShape="1">
+            <a:blip r:embed="rId2">
+              <a:extLst>
+                <a:ext uri="{28A0092B-C50C-407E-A947-70E740481C1C}">
+                  <a14:useLocalDpi xmlns:a14="http://schemas.microsoft.com/office/drawing/2010/main" val="0"/>
+                </a:ext>
+              </a:extLst>
+            </a:blip>
+            <a:srcRect l="2" t="20225" r="75437" b="18752"/>
+            <a:stretch/>
+          </p:blipFill>
+          <p:spPr bwMode="auto">
+            <a:xfrm>
+              <a:off x="4893786" y="1948693"/>
+              <a:ext cx="2994466" cy="3347969"/>
+            </a:xfrm>
+            <a:prstGeom prst="rect">
+              <a:avLst/>
+            </a:prstGeom>
+            <a:noFill/>
+            <a:extLst>
+              <a:ext uri="{909E8E84-426E-40DD-AFC4-6F175D3DCCD1}">
+                <a14:hiddenFill xmlns:a14="http://schemas.microsoft.com/office/drawing/2010/main">
+                  <a:solidFill>
+                    <a:srgbClr val="FFFFFF"/>
+                  </a:solidFill>
+                </a14:hiddenFill>
+              </a:ext>
+            </a:extLst>
+          </p:spPr>
+        </p:pic>
+        <p:pic>
+          <p:nvPicPr>
+            <p:cNvPr id="80" name="Picture 4" descr="Image result for keyboard">
+              <a:extLst>
+                <a:ext uri="{FF2B5EF4-FFF2-40B4-BE49-F238E27FC236}">
+                  <a16:creationId xmlns:a16="http://schemas.microsoft.com/office/drawing/2014/main" id="{AE283C22-8A57-4734-9FC5-92B292C62C70}"/>
+                </a:ext>
+              </a:extLst>
+            </p:cNvPr>
+            <p:cNvPicPr>
+              <a:picLocks noChangeAspect="1" noChangeArrowheads="1"/>
+            </p:cNvPicPr>
+            <p:nvPr/>
+          </p:nvPicPr>
+          <p:blipFill rotWithShape="1">
+            <a:blip r:embed="rId2">
+              <a:extLst>
+                <a:ext uri="{28A0092B-C50C-407E-A947-70E740481C1C}">
+                  <a14:useLocalDpi xmlns:a14="http://schemas.microsoft.com/office/drawing/2010/main" val="0"/>
+                </a:ext>
+              </a:extLst>
+            </a:blip>
+            <a:srcRect l="59015" t="19615" r="18985" b="18811"/>
+            <a:stretch/>
+          </p:blipFill>
+          <p:spPr bwMode="auto">
+            <a:xfrm>
+              <a:off x="8318178" y="1918462"/>
+              <a:ext cx="2682388" cy="3378200"/>
+            </a:xfrm>
+            <a:prstGeom prst="rect">
+              <a:avLst/>
+            </a:prstGeom>
+            <a:noFill/>
+            <a:extLst>
+              <a:ext uri="{909E8E84-426E-40DD-AFC4-6F175D3DCCD1}">
+                <a14:hiddenFill xmlns:a14="http://schemas.microsoft.com/office/drawing/2010/main">
+                  <a:solidFill>
+                    <a:srgbClr val="FFFFFF"/>
+                  </a:solidFill>
+                </a14:hiddenFill>
+              </a:ext>
+            </a:extLst>
+          </p:spPr>
+        </p:pic>
+      </p:grpSp>
+      <p:grpSp>
+        <p:nvGrpSpPr>
+          <p:cNvPr id="68" name="Group 67">
+            <a:extLst>
+              <a:ext uri="{FF2B5EF4-FFF2-40B4-BE49-F238E27FC236}">
+                <a16:creationId xmlns:a16="http://schemas.microsoft.com/office/drawing/2014/main" id="{4C38A914-7C5E-45DB-97BE-E79CA2ECD5F8}"/>
+              </a:ext>
+            </a:extLst>
+          </p:cNvPr>
+          <p:cNvGrpSpPr/>
+          <p:nvPr/>
+        </p:nvGrpSpPr>
+        <p:grpSpPr>
+          <a:xfrm>
+            <a:off x="5756786" y="1225366"/>
+            <a:ext cx="2166937" cy="436350"/>
+            <a:chOff x="7886238" y="1326460"/>
+            <a:chExt cx="2166937" cy="436350"/>
+          </a:xfrm>
+        </p:grpSpPr>
+        <p:cxnSp>
+          <p:nvCxnSpPr>
+            <p:cNvPr id="82" name="Straight Connector 81">
+              <a:extLst>
+                <a:ext uri="{FF2B5EF4-FFF2-40B4-BE49-F238E27FC236}">
+                  <a16:creationId xmlns:a16="http://schemas.microsoft.com/office/drawing/2014/main" id="{B6731E9E-AA0A-4051-B5CF-CCBE60A4E81A}"/>
+                </a:ext>
+              </a:extLst>
+            </p:cNvPr>
+            <p:cNvCxnSpPr/>
+            <p:nvPr/>
+          </p:nvCxnSpPr>
+          <p:spPr>
+            <a:xfrm>
+              <a:off x="7995775" y="1695792"/>
+              <a:ext cx="2057400" cy="0"/>
+            </a:xfrm>
+            <a:prstGeom prst="line">
+              <a:avLst/>
+            </a:prstGeom>
+            <a:ln cap="rnd"/>
+          </p:spPr>
+          <p:style>
+            <a:lnRef idx="3">
+              <a:schemeClr val="accent6"/>
+            </a:lnRef>
+            <a:fillRef idx="0">
+              <a:schemeClr val="accent6"/>
+            </a:fillRef>
+            <a:effectRef idx="2">
+              <a:schemeClr val="accent6"/>
+            </a:effectRef>
+            <a:fontRef idx="minor">
+              <a:schemeClr val="tx1"/>
+            </a:fontRef>
+          </p:style>
+        </p:cxnSp>
+        <p:sp>
+          <p:nvSpPr>
+            <p:cNvPr id="83" name="Oval 82">
+              <a:extLst>
+                <a:ext uri="{FF2B5EF4-FFF2-40B4-BE49-F238E27FC236}">
+                  <a16:creationId xmlns:a16="http://schemas.microsoft.com/office/drawing/2014/main" id="{FA465960-DB0D-46CD-8325-5B378A260064}"/>
+                </a:ext>
+              </a:extLst>
+            </p:cNvPr>
+            <p:cNvSpPr/>
+            <p:nvPr/>
+          </p:nvSpPr>
+          <p:spPr>
+            <a:xfrm>
+              <a:off x="7886238" y="1629460"/>
+              <a:ext cx="133350" cy="133350"/>
+            </a:xfrm>
+            <a:prstGeom prst="ellipse">
+              <a:avLst/>
+            </a:prstGeom>
+          </p:spPr>
+          <p:style>
+            <a:lnRef idx="2">
+              <a:schemeClr val="accent6"/>
+            </a:lnRef>
+            <a:fillRef idx="1">
+              <a:schemeClr val="lt1"/>
+            </a:fillRef>
+            <a:effectRef idx="0">
+              <a:schemeClr val="accent6"/>
+            </a:effectRef>
+            <a:fontRef idx="minor">
+              <a:schemeClr val="dk1"/>
+            </a:fontRef>
+          </p:style>
+          <p:txBody>
+            <a:bodyPr rtlCol="0" anchor="ctr"/>
+            <a:lstStyle/>
+            <a:p>
+              <a:pPr algn="ctr"/>
+              <a:endParaRPr lang="en-US"/>
+            </a:p>
+          </p:txBody>
+        </p:sp>
+        <p:sp>
+          <p:nvSpPr>
+            <p:cNvPr id="84" name="TextBox 83">
+              <a:extLst>
+                <a:ext uri="{FF2B5EF4-FFF2-40B4-BE49-F238E27FC236}">
+                  <a16:creationId xmlns:a16="http://schemas.microsoft.com/office/drawing/2014/main" id="{B9C48476-7589-496A-86FB-05340FA07230}"/>
+                </a:ext>
+              </a:extLst>
+            </p:cNvPr>
+            <p:cNvSpPr txBox="1"/>
+            <p:nvPr/>
+          </p:nvSpPr>
+          <p:spPr>
+            <a:xfrm>
+              <a:off x="7910051" y="1326460"/>
+              <a:ext cx="2143124" cy="369332"/>
+            </a:xfrm>
+            <a:prstGeom prst="rect">
+              <a:avLst/>
+            </a:prstGeom>
+            <a:noFill/>
+          </p:spPr>
+          <p:txBody>
+            <a:bodyPr wrap="square" rtlCol="0">
+              <a:spAutoFit/>
+            </a:bodyPr>
+            <a:lstStyle/>
+            <a:p>
+              <a:pPr algn="r"/>
+              <a:r>
+                <a:rPr lang="en-US" dirty="0" err="1">
+                  <a:solidFill>
+                    <a:schemeClr val="accent6">
+                      <a:lumMod val="75000"/>
+                    </a:schemeClr>
+                  </a:solidFill>
+                </a:rPr>
+                <a:t>KeyboardEvent.key</a:t>
+              </a:r>
+              <a:endParaRPr lang="en-US" dirty="0">
+                <a:solidFill>
+                  <a:schemeClr val="accent6">
+                    <a:lumMod val="75000"/>
+                  </a:schemeClr>
+                </a:solidFill>
+              </a:endParaRPr>
+            </a:p>
+          </p:txBody>
+        </p:sp>
+      </p:grpSp>
+      <p:cxnSp>
+        <p:nvCxnSpPr>
+          <p:cNvPr id="22" name="Straight Connector 21">
+            <a:extLst>
+              <a:ext uri="{FF2B5EF4-FFF2-40B4-BE49-F238E27FC236}">
+                <a16:creationId xmlns:a16="http://schemas.microsoft.com/office/drawing/2014/main" id="{281F65D4-8811-4C7C-9370-9FFB690657BE}"/>
+              </a:ext>
+            </a:extLst>
+          </p:cNvPr>
+          <p:cNvCxnSpPr>
+            <a:cxnSpLocks/>
+          </p:cNvCxnSpPr>
+          <p:nvPr/>
+        </p:nvCxnSpPr>
+        <p:spPr>
+          <a:xfrm flipH="1">
+            <a:off x="10503299" y="3118105"/>
+            <a:ext cx="1104900" cy="1"/>
+          </a:xfrm>
+          <a:prstGeom prst="line">
+            <a:avLst/>
+          </a:prstGeom>
+          <a:ln cap="rnd"/>
+        </p:spPr>
+        <p:style>
+          <a:lnRef idx="3">
+            <a:schemeClr val="accent6"/>
+          </a:lnRef>
+          <a:fillRef idx="0">
+            <a:schemeClr val="accent6"/>
+          </a:fillRef>
+          <a:effectRef idx="2">
+            <a:schemeClr val="accent6"/>
+          </a:effectRef>
+          <a:fontRef idx="minor">
+            <a:schemeClr val="tx1"/>
+          </a:fontRef>
+        </p:style>
+      </p:cxnSp>
+      <p:cxnSp>
+        <p:nvCxnSpPr>
+          <p:cNvPr id="23" name="Straight Connector 22">
+            <a:extLst>
+              <a:ext uri="{FF2B5EF4-FFF2-40B4-BE49-F238E27FC236}">
+                <a16:creationId xmlns:a16="http://schemas.microsoft.com/office/drawing/2014/main" id="{E0D3EF36-CFD1-4353-B6BE-50AEE339ED21}"/>
+              </a:ext>
+            </a:extLst>
+          </p:cNvPr>
+          <p:cNvCxnSpPr>
+            <a:cxnSpLocks/>
+            <a:endCxn id="24" idx="7"/>
+          </p:cNvCxnSpPr>
+          <p:nvPr/>
+        </p:nvCxnSpPr>
+        <p:spPr>
+          <a:xfrm flipH="1">
+            <a:off x="8457679" y="3118105"/>
+            <a:ext cx="2045620" cy="985453"/>
+          </a:xfrm>
+          <a:prstGeom prst="line">
+            <a:avLst/>
+          </a:prstGeom>
+          <a:ln cap="rnd"/>
+        </p:spPr>
+        <p:style>
+          <a:lnRef idx="3">
+            <a:schemeClr val="accent6"/>
+          </a:lnRef>
+          <a:fillRef idx="0">
+            <a:schemeClr val="accent6"/>
+          </a:fillRef>
+          <a:effectRef idx="2">
+            <a:schemeClr val="accent6"/>
+          </a:effectRef>
+          <a:fontRef idx="minor">
+            <a:schemeClr val="tx1"/>
+          </a:fontRef>
+        </p:style>
+      </p:cxnSp>
+      <p:sp>
+        <p:nvSpPr>
+          <p:cNvPr id="24" name="Oval 23">
+            <a:extLst>
+              <a:ext uri="{FF2B5EF4-FFF2-40B4-BE49-F238E27FC236}">
+                <a16:creationId xmlns:a16="http://schemas.microsoft.com/office/drawing/2014/main" id="{9442696C-9BC0-478B-9CA9-E9EE6FB12287}"/>
+              </a:ext>
+            </a:extLst>
+          </p:cNvPr>
+          <p:cNvSpPr/>
+          <p:nvPr/>
+        </p:nvSpPr>
+        <p:spPr>
+          <a:xfrm>
+            <a:off x="8343858" y="4084029"/>
+            <a:ext cx="133350" cy="133350"/>
+          </a:xfrm>
+          <a:prstGeom prst="ellipse">
+            <a:avLst/>
+          </a:prstGeom>
+        </p:spPr>
+        <p:style>
+          <a:lnRef idx="2">
+            <a:schemeClr val="accent6"/>
+          </a:lnRef>
+          <a:fillRef idx="1">
+            <a:schemeClr val="lt1"/>
+          </a:fillRef>
+          <a:effectRef idx="0">
+            <a:schemeClr val="accent6"/>
+          </a:effectRef>
+          <a:fontRef idx="minor">
+            <a:schemeClr val="dk1"/>
+          </a:fontRef>
+        </p:style>
+        <p:txBody>
+          <a:bodyPr rtlCol="0" anchor="ctr"/>
+          <a:lstStyle/>
+          <a:p>
+            <a:pPr algn="ctr"/>
+            <a:endParaRPr lang="en-US"/>
+          </a:p>
+        </p:txBody>
+      </p:sp>
+      <p:sp>
+        <p:nvSpPr>
+          <p:cNvPr id="25" name="TextBox 24">
+            <a:extLst>
+              <a:ext uri="{FF2B5EF4-FFF2-40B4-BE49-F238E27FC236}">
+                <a16:creationId xmlns:a16="http://schemas.microsoft.com/office/drawing/2014/main" id="{5FD8137D-08BF-449C-AE7B-0500735A5E83}"/>
+              </a:ext>
+            </a:extLst>
+          </p:cNvPr>
+          <p:cNvSpPr txBox="1"/>
+          <p:nvPr/>
+        </p:nvSpPr>
+        <p:spPr>
+          <a:xfrm>
+            <a:off x="10876853" y="2763060"/>
+            <a:ext cx="889218" cy="369332"/>
+          </a:xfrm>
+          <a:prstGeom prst="rect">
+            <a:avLst/>
+          </a:prstGeom>
+          <a:noFill/>
+        </p:spPr>
+        <p:txBody>
+          <a:bodyPr wrap="none" rtlCol="0">
+            <a:spAutoFit/>
+          </a:bodyPr>
+          <a:lstStyle/>
+          <a:p>
+            <a:r>
+              <a:rPr lang="en-US" dirty="0">
+                <a:solidFill>
+                  <a:schemeClr val="accent6">
+                    <a:lumMod val="75000"/>
+                  </a:schemeClr>
+                </a:solidFill>
+              </a:rPr>
+              <a:t>“Enter”</a:t>
+            </a:r>
+          </a:p>
+        </p:txBody>
+      </p:sp>
+      <p:cxnSp>
+        <p:nvCxnSpPr>
+          <p:cNvPr id="88" name="Straight Connector 87">
+            <a:extLst>
+              <a:ext uri="{FF2B5EF4-FFF2-40B4-BE49-F238E27FC236}">
+                <a16:creationId xmlns:a16="http://schemas.microsoft.com/office/drawing/2014/main" id="{BA356212-9460-4730-A57B-A54EB7FBA7E9}"/>
+              </a:ext>
+            </a:extLst>
+          </p:cNvPr>
+          <p:cNvCxnSpPr>
+            <a:cxnSpLocks/>
+          </p:cNvCxnSpPr>
+          <p:nvPr/>
+        </p:nvCxnSpPr>
+        <p:spPr>
+          <a:xfrm flipH="1">
+            <a:off x="5119755" y="5879000"/>
+            <a:ext cx="429927" cy="2"/>
+          </a:xfrm>
+          <a:prstGeom prst="line">
+            <a:avLst/>
+          </a:prstGeom>
+          <a:ln cap="rnd"/>
+        </p:spPr>
+        <p:style>
+          <a:lnRef idx="3">
+            <a:schemeClr val="accent6"/>
+          </a:lnRef>
+          <a:fillRef idx="0">
+            <a:schemeClr val="accent6"/>
+          </a:fillRef>
+          <a:effectRef idx="2">
+            <a:schemeClr val="accent6"/>
+          </a:effectRef>
+          <a:fontRef idx="minor">
+            <a:schemeClr val="tx1"/>
+          </a:fontRef>
+        </p:style>
+      </p:cxnSp>
+      <p:sp>
+        <p:nvSpPr>
+          <p:cNvPr id="1046" name="Rectangle 1045">
+            <a:extLst>
+              <a:ext uri="{FF2B5EF4-FFF2-40B4-BE49-F238E27FC236}">
+                <a16:creationId xmlns:a16="http://schemas.microsoft.com/office/drawing/2014/main" id="{E16C08E2-1584-41C6-BAC9-3E0AC8107BF2}"/>
+              </a:ext>
+            </a:extLst>
+          </p:cNvPr>
+          <p:cNvSpPr/>
+          <p:nvPr/>
+        </p:nvSpPr>
+        <p:spPr>
+          <a:xfrm>
+            <a:off x="7022839" y="2032000"/>
+            <a:ext cx="947465" cy="3516244"/>
+          </a:xfrm>
+          <a:prstGeom prst="rect">
+            <a:avLst/>
+          </a:prstGeom>
+          <a:solidFill>
+            <a:schemeClr val="bg1"/>
+          </a:solidFill>
+          <a:ln>
+            <a:noFill/>
+          </a:ln>
+          <a:effectLst>
+            <a:softEdge rad="31750"/>
+          </a:effectLst>
+        </p:spPr>
+        <p:style>
+          <a:lnRef idx="2">
+            <a:schemeClr val="accent1">
+              <a:shade val="50000"/>
+            </a:schemeClr>
+          </a:lnRef>
+          <a:fillRef idx="1">
+            <a:schemeClr val="accent1"/>
+          </a:fillRef>
+          <a:effectRef idx="0">
+            <a:schemeClr val="accent1"/>
+          </a:effectRef>
+          <a:fontRef idx="minor">
+            <a:schemeClr val="lt1"/>
+          </a:fontRef>
+        </p:style>
+        <p:txBody>
+          <a:bodyPr rtlCol="0" anchor="ctr"/>
+          <a:lstStyle/>
+          <a:p>
+            <a:pPr algn="ctr"/>
+            <a:endParaRPr lang="en-US"/>
+          </a:p>
+        </p:txBody>
+      </p:sp>
+      <p:cxnSp>
+        <p:nvCxnSpPr>
+          <p:cNvPr id="89" name="Straight Connector 88">
+            <a:extLst>
+              <a:ext uri="{FF2B5EF4-FFF2-40B4-BE49-F238E27FC236}">
+                <a16:creationId xmlns:a16="http://schemas.microsoft.com/office/drawing/2014/main" id="{8C961CEE-5514-4071-8524-903693F78EF4}"/>
+              </a:ext>
+            </a:extLst>
+          </p:cNvPr>
+          <p:cNvCxnSpPr>
+            <a:cxnSpLocks/>
+            <a:endCxn id="90" idx="3"/>
+          </p:cNvCxnSpPr>
+          <p:nvPr/>
+        </p:nvCxnSpPr>
+        <p:spPr>
+          <a:xfrm flipV="1">
+            <a:off x="5549681" y="5273684"/>
+            <a:ext cx="1276787" cy="605318"/>
+          </a:xfrm>
+          <a:prstGeom prst="line">
+            <a:avLst/>
+          </a:prstGeom>
+          <a:ln cap="rnd"/>
+        </p:spPr>
+        <p:style>
+          <a:lnRef idx="3">
+            <a:schemeClr val="accent6"/>
+          </a:lnRef>
+          <a:fillRef idx="0">
+            <a:schemeClr val="accent6"/>
+          </a:fillRef>
+          <a:effectRef idx="2">
+            <a:schemeClr val="accent6"/>
+          </a:effectRef>
+          <a:fontRef idx="minor">
+            <a:schemeClr val="tx1"/>
+          </a:fontRef>
+        </p:style>
+      </p:cxnSp>
+      <p:sp>
+        <p:nvSpPr>
+          <p:cNvPr id="90" name="Oval 89">
+            <a:extLst>
+              <a:ext uri="{FF2B5EF4-FFF2-40B4-BE49-F238E27FC236}">
+                <a16:creationId xmlns:a16="http://schemas.microsoft.com/office/drawing/2014/main" id="{28D9409B-A08C-4F27-81AD-9894AFCA0F4D}"/>
+              </a:ext>
+            </a:extLst>
+          </p:cNvPr>
+          <p:cNvSpPr/>
+          <p:nvPr/>
+        </p:nvSpPr>
+        <p:spPr>
+          <a:xfrm>
+            <a:off x="6806939" y="5159863"/>
+            <a:ext cx="133350" cy="133350"/>
+          </a:xfrm>
+          <a:prstGeom prst="ellipse">
+            <a:avLst/>
+          </a:prstGeom>
+        </p:spPr>
+        <p:style>
+          <a:lnRef idx="2">
+            <a:schemeClr val="accent6"/>
+          </a:lnRef>
+          <a:fillRef idx="1">
+            <a:schemeClr val="lt1"/>
+          </a:fillRef>
+          <a:effectRef idx="0">
+            <a:schemeClr val="accent6"/>
+          </a:effectRef>
+          <a:fontRef idx="minor">
+            <a:schemeClr val="dk1"/>
+          </a:fontRef>
+        </p:style>
+        <p:txBody>
+          <a:bodyPr rtlCol="0" anchor="ctr"/>
+          <a:lstStyle/>
+          <a:p>
+            <a:pPr algn="ctr"/>
+            <a:endParaRPr lang="en-US"/>
+          </a:p>
+        </p:txBody>
+      </p:sp>
+      <p:sp>
+        <p:nvSpPr>
+          <p:cNvPr id="91" name="TextBox 90">
+            <a:extLst>
+              <a:ext uri="{FF2B5EF4-FFF2-40B4-BE49-F238E27FC236}">
+                <a16:creationId xmlns:a16="http://schemas.microsoft.com/office/drawing/2014/main" id="{686E0CFB-2D8F-444A-A85A-D56E2908FF08}"/>
+              </a:ext>
+            </a:extLst>
+          </p:cNvPr>
+          <p:cNvSpPr txBox="1"/>
+          <p:nvPr/>
+        </p:nvSpPr>
+        <p:spPr>
+          <a:xfrm>
+            <a:off x="5119755" y="5474239"/>
+            <a:ext cx="429926" cy="369332"/>
+          </a:xfrm>
+          <a:prstGeom prst="rect">
+            <a:avLst/>
+          </a:prstGeom>
+          <a:noFill/>
+        </p:spPr>
+        <p:txBody>
+          <a:bodyPr wrap="none" rtlCol="0">
+            <a:spAutoFit/>
+          </a:bodyPr>
+          <a:lstStyle/>
+          <a:p>
+            <a:r>
+              <a:rPr lang="en-US" dirty="0">
+                <a:solidFill>
+                  <a:schemeClr val="accent6">
+                    <a:lumMod val="75000"/>
+                  </a:schemeClr>
+                </a:solidFill>
+              </a:rPr>
+              <a:t>“ ”</a:t>
+            </a:r>
+          </a:p>
+        </p:txBody>
+      </p:sp>
+      <p:cxnSp>
+        <p:nvCxnSpPr>
+          <p:cNvPr id="102" name="Straight Connector 101">
+            <a:extLst>
+              <a:ext uri="{FF2B5EF4-FFF2-40B4-BE49-F238E27FC236}">
+                <a16:creationId xmlns:a16="http://schemas.microsoft.com/office/drawing/2014/main" id="{4E269E96-58A5-4785-9FAC-7EE4DF2003F0}"/>
+              </a:ext>
+            </a:extLst>
+          </p:cNvPr>
+          <p:cNvCxnSpPr>
+            <a:cxnSpLocks/>
+            <a:endCxn id="103" idx="1"/>
+          </p:cNvCxnSpPr>
+          <p:nvPr/>
+        </p:nvCxnSpPr>
+        <p:spPr>
+          <a:xfrm>
+            <a:off x="3976537" y="3006576"/>
+            <a:ext cx="1276787" cy="465362"/>
+          </a:xfrm>
+          <a:prstGeom prst="line">
+            <a:avLst/>
+          </a:prstGeom>
+          <a:ln cap="rnd"/>
+        </p:spPr>
+        <p:style>
+          <a:lnRef idx="3">
+            <a:schemeClr val="accent6"/>
+          </a:lnRef>
+          <a:fillRef idx="0">
+            <a:schemeClr val="accent6"/>
+          </a:fillRef>
+          <a:effectRef idx="2">
+            <a:schemeClr val="accent6"/>
+          </a:effectRef>
+          <a:fontRef idx="minor">
+            <a:schemeClr val="tx1"/>
+          </a:fontRef>
+        </p:style>
+      </p:cxnSp>
+      <p:sp>
+        <p:nvSpPr>
+          <p:cNvPr id="103" name="Oval 102">
+            <a:extLst>
+              <a:ext uri="{FF2B5EF4-FFF2-40B4-BE49-F238E27FC236}">
+                <a16:creationId xmlns:a16="http://schemas.microsoft.com/office/drawing/2014/main" id="{A0BA6FF4-D3E0-4520-9B53-934742B8C999}"/>
+              </a:ext>
+            </a:extLst>
+          </p:cNvPr>
+          <p:cNvSpPr/>
+          <p:nvPr/>
+        </p:nvSpPr>
+        <p:spPr>
+          <a:xfrm>
+            <a:off x="5233795" y="3452409"/>
+            <a:ext cx="133350" cy="133350"/>
+          </a:xfrm>
+          <a:prstGeom prst="ellipse">
+            <a:avLst/>
+          </a:prstGeom>
+        </p:spPr>
+        <p:style>
+          <a:lnRef idx="2">
+            <a:schemeClr val="accent6"/>
+          </a:lnRef>
+          <a:fillRef idx="1">
+            <a:schemeClr val="lt1"/>
+          </a:fillRef>
+          <a:effectRef idx="0">
+            <a:schemeClr val="accent6"/>
+          </a:effectRef>
+          <a:fontRef idx="minor">
+            <a:schemeClr val="dk1"/>
+          </a:fontRef>
+        </p:style>
+        <p:txBody>
+          <a:bodyPr rtlCol="0" anchor="ctr"/>
+          <a:lstStyle/>
+          <a:p>
+            <a:pPr algn="ctr"/>
+            <a:endParaRPr lang="en-US"/>
+          </a:p>
+        </p:txBody>
+      </p:sp>
+      <p:sp>
+        <p:nvSpPr>
+          <p:cNvPr id="104" name="TextBox 103">
+            <a:extLst>
+              <a:ext uri="{FF2B5EF4-FFF2-40B4-BE49-F238E27FC236}">
+                <a16:creationId xmlns:a16="http://schemas.microsoft.com/office/drawing/2014/main" id="{30942C0E-A289-4793-855B-CBAAB0968354}"/>
+              </a:ext>
+            </a:extLst>
+          </p:cNvPr>
+          <p:cNvSpPr txBox="1"/>
+          <p:nvPr/>
+        </p:nvSpPr>
+        <p:spPr>
+          <a:xfrm>
+            <a:off x="2977996" y="2634777"/>
+            <a:ext cx="1138325" cy="369332"/>
+          </a:xfrm>
+          <a:prstGeom prst="rect">
+            <a:avLst/>
+          </a:prstGeom>
+          <a:noFill/>
+        </p:spPr>
+        <p:txBody>
+          <a:bodyPr wrap="none" rtlCol="0">
+            <a:spAutoFit/>
+          </a:bodyPr>
+          <a:lstStyle/>
+          <a:p>
+            <a:r>
+              <a:rPr lang="en-US" dirty="0">
+                <a:solidFill>
+                  <a:schemeClr val="accent6">
+                    <a:lumMod val="75000"/>
+                  </a:schemeClr>
+                </a:solidFill>
+              </a:rPr>
+              <a:t>“q” or “Q”</a:t>
+            </a:r>
+          </a:p>
+        </p:txBody>
+      </p:sp>
+      <p:cxnSp>
+        <p:nvCxnSpPr>
+          <p:cNvPr id="105" name="Straight Connector 104">
+            <a:extLst>
+              <a:ext uri="{FF2B5EF4-FFF2-40B4-BE49-F238E27FC236}">
+                <a16:creationId xmlns:a16="http://schemas.microsoft.com/office/drawing/2014/main" id="{938F731D-4026-48E1-9F8E-FF1DCA8F0E7A}"/>
+              </a:ext>
+            </a:extLst>
+          </p:cNvPr>
+          <p:cNvCxnSpPr>
+            <a:cxnSpLocks/>
+          </p:cNvCxnSpPr>
+          <p:nvPr/>
+        </p:nvCxnSpPr>
+        <p:spPr>
+          <a:xfrm flipH="1">
+            <a:off x="3067764" y="3006576"/>
+            <a:ext cx="908773" cy="0"/>
+          </a:xfrm>
+          <a:prstGeom prst="line">
+            <a:avLst/>
+          </a:prstGeom>
+          <a:ln cap="rnd"/>
+        </p:spPr>
+        <p:style>
+          <a:lnRef idx="3">
+            <a:schemeClr val="accent6"/>
+          </a:lnRef>
+          <a:fillRef idx="0">
+            <a:schemeClr val="accent6"/>
+          </a:fillRef>
+          <a:effectRef idx="2">
+            <a:schemeClr val="accent6"/>
+          </a:effectRef>
+          <a:fontRef idx="minor">
+            <a:schemeClr val="tx1"/>
+          </a:fontRef>
+        </p:style>
+      </p:cxnSp>
+      <p:cxnSp>
+        <p:nvCxnSpPr>
+          <p:cNvPr id="112" name="Straight Connector 111">
+            <a:extLst>
+              <a:ext uri="{FF2B5EF4-FFF2-40B4-BE49-F238E27FC236}">
+                <a16:creationId xmlns:a16="http://schemas.microsoft.com/office/drawing/2014/main" id="{2754A116-FEFB-4527-A3BC-81BC0002745D}"/>
+              </a:ext>
+            </a:extLst>
+          </p:cNvPr>
+          <p:cNvCxnSpPr>
+            <a:cxnSpLocks/>
+          </p:cNvCxnSpPr>
+          <p:nvPr/>
+        </p:nvCxnSpPr>
+        <p:spPr>
+          <a:xfrm>
+            <a:off x="10445750" y="5981081"/>
+            <a:ext cx="1263650" cy="0"/>
+          </a:xfrm>
+          <a:prstGeom prst="line">
+            <a:avLst/>
+          </a:prstGeom>
+          <a:ln cap="rnd"/>
+        </p:spPr>
+        <p:style>
+          <a:lnRef idx="3">
+            <a:schemeClr val="accent6"/>
+          </a:lnRef>
+          <a:fillRef idx="0">
+            <a:schemeClr val="accent6"/>
+          </a:fillRef>
+          <a:effectRef idx="2">
+            <a:schemeClr val="accent6"/>
+          </a:effectRef>
+          <a:fontRef idx="minor">
+            <a:schemeClr val="tx1"/>
+          </a:fontRef>
+        </p:style>
+      </p:cxnSp>
+      <p:cxnSp>
+        <p:nvCxnSpPr>
+          <p:cNvPr id="113" name="Straight Connector 112">
+            <a:extLst>
+              <a:ext uri="{FF2B5EF4-FFF2-40B4-BE49-F238E27FC236}">
+                <a16:creationId xmlns:a16="http://schemas.microsoft.com/office/drawing/2014/main" id="{3D5005AC-F2CA-494B-8F5E-DA017EF79109}"/>
+              </a:ext>
+            </a:extLst>
+          </p:cNvPr>
+          <p:cNvCxnSpPr>
+            <a:cxnSpLocks/>
+            <a:endCxn id="114" idx="5"/>
+          </p:cNvCxnSpPr>
+          <p:nvPr/>
+        </p:nvCxnSpPr>
+        <p:spPr>
+          <a:xfrm flipH="1" flipV="1">
+            <a:off x="9543268" y="5375763"/>
+            <a:ext cx="902482" cy="605318"/>
+          </a:xfrm>
+          <a:prstGeom prst="line">
+            <a:avLst/>
+          </a:prstGeom>
+          <a:ln cap="rnd"/>
+        </p:spPr>
+        <p:style>
+          <a:lnRef idx="3">
+            <a:schemeClr val="accent6"/>
+          </a:lnRef>
+          <a:fillRef idx="0">
+            <a:schemeClr val="accent6"/>
+          </a:fillRef>
+          <a:effectRef idx="2">
+            <a:schemeClr val="accent6"/>
+          </a:effectRef>
+          <a:fontRef idx="minor">
+            <a:schemeClr val="tx1"/>
+          </a:fontRef>
+        </p:style>
+      </p:cxnSp>
+      <p:sp>
+        <p:nvSpPr>
+          <p:cNvPr id="114" name="Oval 113">
+            <a:extLst>
+              <a:ext uri="{FF2B5EF4-FFF2-40B4-BE49-F238E27FC236}">
+                <a16:creationId xmlns:a16="http://schemas.microsoft.com/office/drawing/2014/main" id="{D414E2CD-8896-424A-988A-D237AF2F1D08}"/>
+              </a:ext>
+            </a:extLst>
+          </p:cNvPr>
+          <p:cNvSpPr/>
+          <p:nvPr/>
+        </p:nvSpPr>
+        <p:spPr>
+          <a:xfrm>
+            <a:off x="9429447" y="5261942"/>
+            <a:ext cx="133350" cy="133350"/>
+          </a:xfrm>
+          <a:prstGeom prst="ellipse">
+            <a:avLst/>
+          </a:prstGeom>
+        </p:spPr>
+        <p:style>
+          <a:lnRef idx="2">
+            <a:schemeClr val="accent6"/>
+          </a:lnRef>
+          <a:fillRef idx="1">
+            <a:schemeClr val="lt1"/>
+          </a:fillRef>
+          <a:effectRef idx="0">
+            <a:schemeClr val="accent6"/>
+          </a:effectRef>
+          <a:fontRef idx="minor">
+            <a:schemeClr val="dk1"/>
+          </a:fontRef>
+        </p:style>
+        <p:txBody>
+          <a:bodyPr rtlCol="0" anchor="ctr"/>
+          <a:lstStyle/>
+          <a:p>
+            <a:pPr algn="ctr"/>
+            <a:endParaRPr lang="en-US"/>
+          </a:p>
+        </p:txBody>
+      </p:sp>
+      <p:sp>
+        <p:nvSpPr>
+          <p:cNvPr id="115" name="TextBox 114">
+            <a:extLst>
+              <a:ext uri="{FF2B5EF4-FFF2-40B4-BE49-F238E27FC236}">
+                <a16:creationId xmlns:a16="http://schemas.microsoft.com/office/drawing/2014/main" id="{D21304A2-B721-4941-86A9-F8BE1B5EDF39}"/>
+              </a:ext>
+            </a:extLst>
+          </p:cNvPr>
+          <p:cNvSpPr txBox="1"/>
+          <p:nvPr/>
+        </p:nvSpPr>
+        <p:spPr>
+          <a:xfrm>
+            <a:off x="10282203" y="5654548"/>
+            <a:ext cx="1483868" cy="369332"/>
+          </a:xfrm>
+          <a:prstGeom prst="rect">
+            <a:avLst/>
+          </a:prstGeom>
+          <a:noFill/>
+        </p:spPr>
+        <p:txBody>
+          <a:bodyPr wrap="none" rtlCol="0">
+            <a:spAutoFit/>
+          </a:bodyPr>
+          <a:lstStyle/>
+          <a:p>
+            <a:r>
+              <a:rPr lang="en-US" dirty="0">
+                <a:solidFill>
+                  <a:schemeClr val="accent6">
+                    <a:lumMod val="75000"/>
+                  </a:schemeClr>
+                </a:solidFill>
+              </a:rPr>
+              <a:t>“</a:t>
+            </a:r>
+            <a:r>
+              <a:rPr lang="en-US" dirty="0" err="1">
+                <a:solidFill>
+                  <a:schemeClr val="accent6">
+                    <a:lumMod val="75000"/>
+                  </a:schemeClr>
+                </a:solidFill>
+              </a:rPr>
+              <a:t>ArrowDown</a:t>
+            </a:r>
+            <a:r>
+              <a:rPr lang="en-US" dirty="0">
+                <a:solidFill>
+                  <a:schemeClr val="accent6">
+                    <a:lumMod val="75000"/>
+                  </a:schemeClr>
+                </a:solidFill>
+              </a:rPr>
+              <a:t>”</a:t>
+            </a:r>
+          </a:p>
+        </p:txBody>
+      </p:sp>
+      <p:cxnSp>
+        <p:nvCxnSpPr>
+          <p:cNvPr id="122" name="Straight Connector 121">
+            <a:extLst>
+              <a:ext uri="{FF2B5EF4-FFF2-40B4-BE49-F238E27FC236}">
+                <a16:creationId xmlns:a16="http://schemas.microsoft.com/office/drawing/2014/main" id="{B6BBC830-9ED5-4D2C-ABB9-AA8F07D3DA57}"/>
+              </a:ext>
+            </a:extLst>
+          </p:cNvPr>
+          <p:cNvCxnSpPr>
+            <a:cxnSpLocks/>
+          </p:cNvCxnSpPr>
+          <p:nvPr/>
+        </p:nvCxnSpPr>
+        <p:spPr>
+          <a:xfrm flipH="1">
+            <a:off x="2748744" y="5261942"/>
+            <a:ext cx="1242968" cy="0"/>
+          </a:xfrm>
+          <a:prstGeom prst="line">
+            <a:avLst/>
+          </a:prstGeom>
+          <a:ln cap="rnd"/>
+        </p:spPr>
+        <p:style>
+          <a:lnRef idx="3">
+            <a:schemeClr val="accent6"/>
+          </a:lnRef>
+          <a:fillRef idx="0">
+            <a:schemeClr val="accent6"/>
+          </a:fillRef>
+          <a:effectRef idx="2">
+            <a:schemeClr val="accent6"/>
+          </a:effectRef>
+          <a:fontRef idx="minor">
+            <a:schemeClr val="tx1"/>
+          </a:fontRef>
+        </p:style>
+      </p:cxnSp>
+      <p:cxnSp>
+        <p:nvCxnSpPr>
+          <p:cNvPr id="123" name="Straight Connector 122">
+            <a:extLst>
+              <a:ext uri="{FF2B5EF4-FFF2-40B4-BE49-F238E27FC236}">
+                <a16:creationId xmlns:a16="http://schemas.microsoft.com/office/drawing/2014/main" id="{B383A72C-3239-4A50-911E-019CAA875CA6}"/>
+              </a:ext>
+            </a:extLst>
+          </p:cNvPr>
+          <p:cNvCxnSpPr>
+            <a:cxnSpLocks/>
+            <a:endCxn id="124" idx="3"/>
+          </p:cNvCxnSpPr>
+          <p:nvPr/>
+        </p:nvCxnSpPr>
+        <p:spPr>
+          <a:xfrm flipV="1">
+            <a:off x="4006001" y="4656624"/>
+            <a:ext cx="449455" cy="599239"/>
+          </a:xfrm>
+          <a:prstGeom prst="line">
+            <a:avLst/>
+          </a:prstGeom>
+          <a:ln cap="rnd"/>
+        </p:spPr>
+        <p:style>
+          <a:lnRef idx="3">
+            <a:schemeClr val="accent6"/>
+          </a:lnRef>
+          <a:fillRef idx="0">
+            <a:schemeClr val="accent6"/>
+          </a:fillRef>
+          <a:effectRef idx="2">
+            <a:schemeClr val="accent6"/>
+          </a:effectRef>
+          <a:fontRef idx="minor">
+            <a:schemeClr val="tx1"/>
+          </a:fontRef>
+        </p:style>
+      </p:cxnSp>
+      <p:sp>
+        <p:nvSpPr>
+          <p:cNvPr id="124" name="Oval 123">
+            <a:extLst>
+              <a:ext uri="{FF2B5EF4-FFF2-40B4-BE49-F238E27FC236}">
+                <a16:creationId xmlns:a16="http://schemas.microsoft.com/office/drawing/2014/main" id="{77128B33-EA79-4B1B-9E5A-2AA2280F8B92}"/>
+              </a:ext>
+            </a:extLst>
+          </p:cNvPr>
+          <p:cNvSpPr/>
+          <p:nvPr/>
+        </p:nvSpPr>
+        <p:spPr>
+          <a:xfrm>
+            <a:off x="4435927" y="4542803"/>
+            <a:ext cx="133350" cy="133350"/>
+          </a:xfrm>
+          <a:prstGeom prst="ellipse">
+            <a:avLst/>
+          </a:prstGeom>
+        </p:spPr>
+        <p:style>
+          <a:lnRef idx="2">
+            <a:schemeClr val="accent6"/>
+          </a:lnRef>
+          <a:fillRef idx="1">
+            <a:schemeClr val="lt1"/>
+          </a:fillRef>
+          <a:effectRef idx="0">
+            <a:schemeClr val="accent6"/>
+          </a:effectRef>
+          <a:fontRef idx="minor">
+            <a:schemeClr val="dk1"/>
+          </a:fontRef>
+        </p:style>
+        <p:txBody>
+          <a:bodyPr rtlCol="0" anchor="ctr"/>
+          <a:lstStyle/>
+          <a:p>
+            <a:pPr algn="ctr"/>
+            <a:endParaRPr lang="en-US"/>
+          </a:p>
+        </p:txBody>
+      </p:sp>
+      <p:sp>
+        <p:nvSpPr>
+          <p:cNvPr id="125" name="TextBox 124">
+            <a:extLst>
+              <a:ext uri="{FF2B5EF4-FFF2-40B4-BE49-F238E27FC236}">
+                <a16:creationId xmlns:a16="http://schemas.microsoft.com/office/drawing/2014/main" id="{D0102C8F-245B-4F76-86A3-CA9B0B9F6F37}"/>
+              </a:ext>
+            </a:extLst>
+          </p:cNvPr>
+          <p:cNvSpPr txBox="1"/>
+          <p:nvPr/>
+        </p:nvSpPr>
+        <p:spPr>
+          <a:xfrm>
+            <a:off x="2748743" y="4857179"/>
+            <a:ext cx="813043" cy="369332"/>
+          </a:xfrm>
+          <a:prstGeom prst="rect">
+            <a:avLst/>
+          </a:prstGeom>
+          <a:noFill/>
+        </p:spPr>
+        <p:txBody>
+          <a:bodyPr wrap="none" rtlCol="0">
+            <a:spAutoFit/>
+          </a:bodyPr>
+          <a:lstStyle/>
+          <a:p>
+            <a:r>
+              <a:rPr lang="en-US" dirty="0">
+                <a:solidFill>
+                  <a:schemeClr val="accent6">
+                    <a:lumMod val="75000"/>
+                  </a:schemeClr>
+                </a:solidFill>
+              </a:rPr>
+              <a:t>“Shift”</a:t>
+            </a:r>
+          </a:p>
+        </p:txBody>
+      </p:sp>
+      <p:sp>
+        <p:nvSpPr>
+          <p:cNvPr id="130" name="TextBox 129">
+            <a:extLst>
+              <a:ext uri="{FF2B5EF4-FFF2-40B4-BE49-F238E27FC236}">
+                <a16:creationId xmlns:a16="http://schemas.microsoft.com/office/drawing/2014/main" id="{E4513F71-6755-4379-91CC-DD6C879AA7A5}"/>
+              </a:ext>
+            </a:extLst>
+          </p:cNvPr>
+          <p:cNvSpPr txBox="1"/>
+          <p:nvPr/>
+        </p:nvSpPr>
+        <p:spPr>
+          <a:xfrm>
+            <a:off x="6144614" y="1594698"/>
+            <a:ext cx="1154355" cy="553998"/>
+          </a:xfrm>
+          <a:prstGeom prst="rect">
+            <a:avLst/>
+          </a:prstGeom>
+          <a:noFill/>
+        </p:spPr>
+        <p:txBody>
+          <a:bodyPr wrap="none" rtlCol="0">
+            <a:spAutoFit/>
+          </a:bodyPr>
+          <a:lstStyle/>
+          <a:p>
+            <a:r>
+              <a:rPr lang="en-US" sz="1200" dirty="0">
+                <a:solidFill>
+                  <a:schemeClr val="bg1">
+                    <a:lumMod val="50000"/>
+                  </a:schemeClr>
+                </a:solidFill>
+              </a:rPr>
+              <a:t>Example Values</a:t>
+            </a:r>
+          </a:p>
+          <a:p>
+            <a:endParaRPr lang="en-US" dirty="0"/>
+          </a:p>
+        </p:txBody>
+      </p:sp>
+    </p:spTree>
+    <p:extLst>
+      <p:ext uri="{BB962C8B-B14F-4D97-AF65-F5344CB8AC3E}">
+        <p14:creationId xmlns:p14="http://schemas.microsoft.com/office/powerpoint/2010/main" val="1380440346"/>
+      </p:ext>
+    </p:extLst>
+  </p:cSld>
+  <p:clrMapOvr>
+    <a:masterClrMapping/>
+  </p:clrMapOvr>
+</p:sld>
+</file>
+
+<file path=ppt/slides/slide3.xml><?xml version="1.0" encoding="utf-8"?>
+<p:sld xmlns:a="http://schemas.openxmlformats.org/drawingml/2006/main" xmlns:r="http://schemas.openxmlformats.org/officeDocument/2006/relationships" xmlns:p="http://schemas.openxmlformats.org/presentationml/2006/main">
+  <p:cSld>
+    <p:spTree>
+      <p:nvGrpSpPr>
+        <p:cNvPr id="1" name=""/>
+        <p:cNvGrpSpPr/>
+        <p:nvPr/>
+      </p:nvGrpSpPr>
+      <p:grpSpPr>
+        <a:xfrm>
+          <a:off x="0" y="0"/>
+          <a:ext cx="0" cy="0"/>
+          <a:chOff x="0" y="0"/>
+          <a:chExt cx="0" cy="0"/>
+        </a:xfrm>
+      </p:grpSpPr>
+      <p:sp>
+        <p:nvSpPr>
+          <p:cNvPr id="76" name="Rectangle 75">
+            <a:extLst>
+              <a:ext uri="{FF2B5EF4-FFF2-40B4-BE49-F238E27FC236}">
+                <a16:creationId xmlns:a16="http://schemas.microsoft.com/office/drawing/2014/main" id="{981E1C58-77CF-43EC-B890-0FE2D629745B}"/>
+              </a:ext>
+            </a:extLst>
+          </p:cNvPr>
+          <p:cNvSpPr/>
+          <p:nvPr/>
+        </p:nvSpPr>
+        <p:spPr>
+          <a:xfrm>
+            <a:off x="0" y="0"/>
+            <a:ext cx="12192000" cy="6858000"/>
+          </a:xfrm>
+          <a:prstGeom prst="rect">
+            <a:avLst/>
+          </a:prstGeom>
+          <a:solidFill>
+            <a:schemeClr val="bg1"/>
+          </a:solidFill>
+          <a:ln>
+            <a:noFill/>
+          </a:ln>
+        </p:spPr>
+        <p:style>
+          <a:lnRef idx="2">
+            <a:schemeClr val="accent1">
+              <a:shade val="50000"/>
+            </a:schemeClr>
+          </a:lnRef>
+          <a:fillRef idx="1">
+            <a:schemeClr val="accent1"/>
+          </a:fillRef>
+          <a:effectRef idx="0">
+            <a:schemeClr val="accent1"/>
+          </a:effectRef>
+          <a:fontRef idx="minor">
+            <a:schemeClr val="lt1"/>
+          </a:fontRef>
+        </p:style>
+        <p:txBody>
+          <a:bodyPr rtlCol="0" anchor="ctr"/>
+          <a:lstStyle/>
+          <a:p>
+            <a:pPr algn="ctr"/>
+            <a:endParaRPr lang="en-US"/>
+          </a:p>
+        </p:txBody>
+      </p:sp>
+      <p:pic>
+        <p:nvPicPr>
+          <p:cNvPr id="3" name="Picture 2" descr="A picture containing indoor&#10;&#10;Description automatically generated">
+            <a:extLst>
+              <a:ext uri="{FF2B5EF4-FFF2-40B4-BE49-F238E27FC236}">
+                <a16:creationId xmlns:a16="http://schemas.microsoft.com/office/drawing/2014/main" id="{AEF42CBA-A185-4871-91ED-C5AA4A9C3370}"/>
+              </a:ext>
+            </a:extLst>
+          </p:cNvPr>
+          <p:cNvPicPr>
+            <a:picLocks noChangeAspect="1"/>
+          </p:cNvPicPr>
+          <p:nvPr/>
+        </p:nvPicPr>
+        <p:blipFill>
+          <a:blip r:embed="rId2">
+            <a:extLst>
+              <a:ext uri="{28A0092B-C50C-407E-A947-70E740481C1C}">
+                <a14:useLocalDpi xmlns:a14="http://schemas.microsoft.com/office/drawing/2010/main" val="0"/>
+              </a:ext>
+            </a:extLst>
+          </a:blip>
+          <a:stretch>
+            <a:fillRect/>
+          </a:stretch>
+        </p:blipFill>
+        <p:spPr>
+          <a:xfrm>
+            <a:off x="5691832" y="1796095"/>
+            <a:ext cx="4914597" cy="4914597"/>
+          </a:xfrm>
+          <a:prstGeom prst="rect">
+            <a:avLst/>
+          </a:prstGeom>
+        </p:spPr>
+      </p:pic>
+      <p:cxnSp>
+        <p:nvCxnSpPr>
+          <p:cNvPr id="5" name="Straight Connector 4">
+            <a:extLst>
+              <a:ext uri="{FF2B5EF4-FFF2-40B4-BE49-F238E27FC236}">
+                <a16:creationId xmlns:a16="http://schemas.microsoft.com/office/drawing/2014/main" id="{137595DA-6D53-45A0-9254-830836053E7D}"/>
+              </a:ext>
+            </a:extLst>
+          </p:cNvPr>
+          <p:cNvCxnSpPr>
+            <a:cxnSpLocks/>
+          </p:cNvCxnSpPr>
+          <p:nvPr/>
+        </p:nvCxnSpPr>
+        <p:spPr>
+          <a:xfrm flipV="1">
+            <a:off x="509125" y="1442556"/>
+            <a:ext cx="2398330" cy="19052"/>
+          </a:xfrm>
+          <a:prstGeom prst="line">
+            <a:avLst/>
+          </a:prstGeom>
+          <a:ln cap="rnd"/>
+        </p:spPr>
+        <p:style>
+          <a:lnRef idx="3">
+            <a:schemeClr val="accent6"/>
+          </a:lnRef>
+          <a:fillRef idx="0">
+            <a:schemeClr val="accent6"/>
+          </a:fillRef>
+          <a:effectRef idx="2">
+            <a:schemeClr val="accent6"/>
+          </a:effectRef>
+          <a:fontRef idx="minor">
+            <a:schemeClr val="tx1"/>
+          </a:fontRef>
+        </p:style>
+      </p:cxnSp>
+      <p:sp>
+        <p:nvSpPr>
+          <p:cNvPr id="11" name="Oval 10">
+            <a:extLst>
+              <a:ext uri="{FF2B5EF4-FFF2-40B4-BE49-F238E27FC236}">
+                <a16:creationId xmlns:a16="http://schemas.microsoft.com/office/drawing/2014/main" id="{B8162159-F990-4B83-B1ED-B71983DC26AC}"/>
+              </a:ext>
+            </a:extLst>
+          </p:cNvPr>
+          <p:cNvSpPr/>
+          <p:nvPr/>
+        </p:nvSpPr>
+        <p:spPr>
+          <a:xfrm>
+            <a:off x="2900795" y="1385407"/>
+            <a:ext cx="133350" cy="133350"/>
+          </a:xfrm>
+          <a:prstGeom prst="ellipse">
+            <a:avLst/>
+          </a:prstGeom>
+        </p:spPr>
+        <p:style>
+          <a:lnRef idx="2">
+            <a:schemeClr val="accent6"/>
+          </a:lnRef>
+          <a:fillRef idx="1">
+            <a:schemeClr val="lt1"/>
+          </a:fillRef>
+          <a:effectRef idx="0">
+            <a:schemeClr val="accent6"/>
+          </a:effectRef>
+          <a:fontRef idx="minor">
+            <a:schemeClr val="dk1"/>
+          </a:fontRef>
+        </p:style>
+        <p:txBody>
+          <a:bodyPr rtlCol="0" anchor="ctr"/>
+          <a:lstStyle/>
+          <a:p>
+            <a:pPr algn="ctr"/>
+            <a:endParaRPr lang="en-US"/>
+          </a:p>
+        </p:txBody>
+      </p:sp>
+      <p:sp>
+        <p:nvSpPr>
+          <p:cNvPr id="12" name="TextBox 11">
+            <a:extLst>
+              <a:ext uri="{FF2B5EF4-FFF2-40B4-BE49-F238E27FC236}">
+                <a16:creationId xmlns:a16="http://schemas.microsoft.com/office/drawing/2014/main" id="{2F21B15B-18F0-404B-A4D9-CF02D6672999}"/>
+              </a:ext>
+            </a:extLst>
+          </p:cNvPr>
+          <p:cNvSpPr txBox="1"/>
+          <p:nvPr/>
+        </p:nvSpPr>
+        <p:spPr>
+          <a:xfrm>
+            <a:off x="423401" y="1073224"/>
+            <a:ext cx="2625270" cy="369332"/>
+          </a:xfrm>
+          <a:prstGeom prst="rect">
+            <a:avLst/>
+          </a:prstGeom>
+          <a:noFill/>
+        </p:spPr>
+        <p:txBody>
+          <a:bodyPr wrap="none" rtlCol="0">
+            <a:spAutoFit/>
+          </a:bodyPr>
+          <a:lstStyle/>
+          <a:p>
+            <a:r>
+              <a:rPr lang="en-US" dirty="0" err="1">
+                <a:solidFill>
+                  <a:schemeClr val="accent6">
+                    <a:lumMod val="75000"/>
+                  </a:schemeClr>
+                </a:solidFill>
+              </a:rPr>
+              <a:t>onMouse</a:t>
+            </a:r>
+            <a:r>
+              <a:rPr lang="en-US" dirty="0">
+                <a:solidFill>
+                  <a:schemeClr val="accent6">
+                    <a:lumMod val="75000"/>
+                  </a:schemeClr>
+                </a:solidFill>
+              </a:rPr>
+              <a:t>[Move/*](event)</a:t>
+            </a:r>
+          </a:p>
+        </p:txBody>
+      </p:sp>
+      <p:sp>
+        <p:nvSpPr>
+          <p:cNvPr id="38" name="TextBox 37">
+            <a:extLst>
+              <a:ext uri="{FF2B5EF4-FFF2-40B4-BE49-F238E27FC236}">
+                <a16:creationId xmlns:a16="http://schemas.microsoft.com/office/drawing/2014/main" id="{91D2CAB9-EF2E-4B5B-B20A-806B6DD60F42}"/>
+              </a:ext>
+            </a:extLst>
+          </p:cNvPr>
+          <p:cNvSpPr txBox="1"/>
+          <p:nvPr/>
+        </p:nvSpPr>
+        <p:spPr>
+          <a:xfrm>
+            <a:off x="0" y="250222"/>
+            <a:ext cx="12192000" cy="523220"/>
+          </a:xfrm>
+          <a:prstGeom prst="rect">
+            <a:avLst/>
+          </a:prstGeom>
+          <a:noFill/>
+        </p:spPr>
+        <p:txBody>
+          <a:bodyPr wrap="square" rtlCol="0">
+            <a:spAutoFit/>
+          </a:bodyPr>
+          <a:lstStyle/>
+          <a:p>
+            <a:pPr algn="ctr"/>
+            <a:r>
+              <a:rPr lang="en-US" sz="2800" dirty="0">
+                <a:solidFill>
+                  <a:schemeClr val="accent6">
+                    <a:lumMod val="75000"/>
+                  </a:schemeClr>
+                </a:solidFill>
+              </a:rPr>
+              <a:t>Mice in </a:t>
+            </a:r>
+            <a:r>
+              <a:rPr lang="en-US" sz="2800" dirty="0" err="1">
+                <a:solidFill>
+                  <a:schemeClr val="accent6">
+                    <a:lumMod val="75000"/>
+                  </a:schemeClr>
+                </a:solidFill>
+              </a:rPr>
+              <a:t>Javascript</a:t>
+            </a:r>
+            <a:endParaRPr lang="en-US" sz="2800" dirty="0">
+              <a:solidFill>
+                <a:schemeClr val="accent6">
+                  <a:lumMod val="75000"/>
+                </a:schemeClr>
+              </a:solidFill>
+            </a:endParaRPr>
+          </a:p>
+        </p:txBody>
+      </p:sp>
+      <p:grpSp>
+        <p:nvGrpSpPr>
+          <p:cNvPr id="49" name="Group 48">
+            <a:extLst>
+              <a:ext uri="{FF2B5EF4-FFF2-40B4-BE49-F238E27FC236}">
+                <a16:creationId xmlns:a16="http://schemas.microsoft.com/office/drawing/2014/main" id="{B8CE06AF-2806-4107-95D9-AAC286CC343B}"/>
+              </a:ext>
+            </a:extLst>
+          </p:cNvPr>
+          <p:cNvGrpSpPr/>
+          <p:nvPr/>
+        </p:nvGrpSpPr>
+        <p:grpSpPr>
+          <a:xfrm>
+            <a:off x="3766877" y="629685"/>
+            <a:ext cx="4498072" cy="297874"/>
+            <a:chOff x="3971469" y="624781"/>
+            <a:chExt cx="4498072" cy="297874"/>
+          </a:xfrm>
+        </p:grpSpPr>
+        <p:cxnSp>
+          <p:nvCxnSpPr>
+            <p:cNvPr id="40" name="Straight Connector 39">
+              <a:extLst>
+                <a:ext uri="{FF2B5EF4-FFF2-40B4-BE49-F238E27FC236}">
+                  <a16:creationId xmlns:a16="http://schemas.microsoft.com/office/drawing/2014/main" id="{D6E0AC31-61D0-4CE2-AA3B-3C6978E8704A}"/>
+                </a:ext>
+              </a:extLst>
+            </p:cNvPr>
+            <p:cNvCxnSpPr/>
+            <p:nvPr/>
+          </p:nvCxnSpPr>
+          <p:spPr>
+            <a:xfrm>
+              <a:off x="5170031" y="773442"/>
+              <a:ext cx="2057400" cy="0"/>
+            </a:xfrm>
+            <a:prstGeom prst="line">
+              <a:avLst/>
+            </a:prstGeom>
+            <a:ln cap="rnd"/>
+          </p:spPr>
+          <p:style>
+            <a:lnRef idx="3">
+              <a:schemeClr val="accent6"/>
+            </a:lnRef>
+            <a:fillRef idx="0">
+              <a:schemeClr val="accent6"/>
+            </a:fillRef>
+            <a:effectRef idx="2">
+              <a:schemeClr val="accent6"/>
+            </a:effectRef>
+            <a:fontRef idx="minor">
+              <a:schemeClr val="tx1"/>
+            </a:fontRef>
+          </p:style>
+        </p:cxnSp>
+        <p:cxnSp>
+          <p:nvCxnSpPr>
+            <p:cNvPr id="41" name="Straight Connector 40">
+              <a:extLst>
+                <a:ext uri="{FF2B5EF4-FFF2-40B4-BE49-F238E27FC236}">
+                  <a16:creationId xmlns:a16="http://schemas.microsoft.com/office/drawing/2014/main" id="{B388F3BF-FB37-4435-8519-443F06647178}"/>
+                </a:ext>
+              </a:extLst>
+            </p:cNvPr>
+            <p:cNvCxnSpPr>
+              <a:cxnSpLocks/>
+            </p:cNvCxnSpPr>
+            <p:nvPr/>
+          </p:nvCxnSpPr>
+          <p:spPr>
+            <a:xfrm>
+              <a:off x="7349270" y="697242"/>
+              <a:ext cx="1027511" cy="0"/>
+            </a:xfrm>
+            <a:prstGeom prst="line">
+              <a:avLst/>
+            </a:prstGeom>
+            <a:ln cap="rnd"/>
+          </p:spPr>
+          <p:style>
+            <a:lnRef idx="3">
+              <a:schemeClr val="accent6"/>
+            </a:lnRef>
+            <a:fillRef idx="0">
+              <a:schemeClr val="accent6"/>
+            </a:fillRef>
+            <a:effectRef idx="2">
+              <a:schemeClr val="accent6"/>
+            </a:effectRef>
+            <a:fontRef idx="minor">
+              <a:schemeClr val="tx1"/>
+            </a:fontRef>
+          </p:style>
+        </p:cxnSp>
+        <p:cxnSp>
+          <p:nvCxnSpPr>
+            <p:cNvPr id="43" name="Straight Connector 42">
+              <a:extLst>
+                <a:ext uri="{FF2B5EF4-FFF2-40B4-BE49-F238E27FC236}">
+                  <a16:creationId xmlns:a16="http://schemas.microsoft.com/office/drawing/2014/main" id="{EC5F7052-9710-4CD3-8A81-EEE0E9A7244C}"/>
+                </a:ext>
+              </a:extLst>
+            </p:cNvPr>
+            <p:cNvCxnSpPr>
+              <a:cxnSpLocks/>
+            </p:cNvCxnSpPr>
+            <p:nvPr/>
+          </p:nvCxnSpPr>
+          <p:spPr>
+            <a:xfrm flipV="1">
+              <a:off x="7227431" y="697242"/>
+              <a:ext cx="121839" cy="76200"/>
+            </a:xfrm>
+            <a:prstGeom prst="line">
+              <a:avLst/>
+            </a:prstGeom>
+            <a:ln cap="rnd"/>
+          </p:spPr>
+          <p:style>
+            <a:lnRef idx="3">
+              <a:schemeClr val="accent6"/>
+            </a:lnRef>
+            <a:fillRef idx="0">
+              <a:schemeClr val="accent6"/>
+            </a:fillRef>
+            <a:effectRef idx="2">
+              <a:schemeClr val="accent6"/>
+            </a:effectRef>
+            <a:fontRef idx="minor">
+              <a:schemeClr val="tx1"/>
+            </a:fontRef>
+          </p:style>
+        </p:cxnSp>
+        <p:cxnSp>
+          <p:nvCxnSpPr>
+            <p:cNvPr id="46" name="Straight Connector 45">
+              <a:extLst>
+                <a:ext uri="{FF2B5EF4-FFF2-40B4-BE49-F238E27FC236}">
+                  <a16:creationId xmlns:a16="http://schemas.microsoft.com/office/drawing/2014/main" id="{C86B609C-3E9D-4EA1-9D7B-7AD108C8C57B}"/>
+                </a:ext>
+              </a:extLst>
+            </p:cNvPr>
+            <p:cNvCxnSpPr>
+              <a:cxnSpLocks/>
+            </p:cNvCxnSpPr>
+            <p:nvPr/>
+          </p:nvCxnSpPr>
+          <p:spPr>
+            <a:xfrm flipV="1">
+              <a:off x="5048192" y="773442"/>
+              <a:ext cx="121839" cy="76200"/>
+            </a:xfrm>
+            <a:prstGeom prst="line">
+              <a:avLst/>
+            </a:prstGeom>
+            <a:ln cap="rnd"/>
+          </p:spPr>
+          <p:style>
+            <a:lnRef idx="3">
+              <a:schemeClr val="accent6"/>
+            </a:lnRef>
+            <a:fillRef idx="0">
+              <a:schemeClr val="accent6"/>
+            </a:fillRef>
+            <a:effectRef idx="2">
+              <a:schemeClr val="accent6"/>
+            </a:effectRef>
+            <a:fontRef idx="minor">
+              <a:schemeClr val="tx1"/>
+            </a:fontRef>
+          </p:style>
+        </p:cxnSp>
+        <p:cxnSp>
+          <p:nvCxnSpPr>
+            <p:cNvPr id="47" name="Straight Connector 46">
+              <a:extLst>
+                <a:ext uri="{FF2B5EF4-FFF2-40B4-BE49-F238E27FC236}">
+                  <a16:creationId xmlns:a16="http://schemas.microsoft.com/office/drawing/2014/main" id="{0D690C07-0109-4CEC-B0CC-434EED608911}"/>
+                </a:ext>
+              </a:extLst>
+            </p:cNvPr>
+            <p:cNvCxnSpPr>
+              <a:cxnSpLocks/>
+            </p:cNvCxnSpPr>
+            <p:nvPr/>
+          </p:nvCxnSpPr>
+          <p:spPr>
+            <a:xfrm flipV="1">
+              <a:off x="4021655" y="849642"/>
+              <a:ext cx="1026537" cy="11668"/>
+            </a:xfrm>
+            <a:prstGeom prst="line">
+              <a:avLst/>
+            </a:prstGeom>
+            <a:ln cap="rnd"/>
+          </p:spPr>
+          <p:style>
+            <a:lnRef idx="3">
+              <a:schemeClr val="accent6"/>
+            </a:lnRef>
+            <a:fillRef idx="0">
+              <a:schemeClr val="accent6"/>
+            </a:fillRef>
+            <a:effectRef idx="2">
+              <a:schemeClr val="accent6"/>
+            </a:effectRef>
+            <a:fontRef idx="minor">
+              <a:schemeClr val="tx1"/>
+            </a:fontRef>
+          </p:style>
+        </p:cxnSp>
+        <p:sp>
+          <p:nvSpPr>
+            <p:cNvPr id="50" name="Oval 49">
+              <a:extLst>
+                <a:ext uri="{FF2B5EF4-FFF2-40B4-BE49-F238E27FC236}">
+                  <a16:creationId xmlns:a16="http://schemas.microsoft.com/office/drawing/2014/main" id="{EEA3A56A-D77B-4804-9467-3C2325189A39}"/>
+                </a:ext>
+              </a:extLst>
+            </p:cNvPr>
+            <p:cNvSpPr/>
+            <p:nvPr/>
+          </p:nvSpPr>
+          <p:spPr>
+            <a:xfrm>
+              <a:off x="3971469" y="789305"/>
+              <a:ext cx="133350" cy="133350"/>
+            </a:xfrm>
+            <a:prstGeom prst="ellipse">
+              <a:avLst/>
+            </a:prstGeom>
+          </p:spPr>
+          <p:style>
+            <a:lnRef idx="2">
+              <a:schemeClr val="accent6"/>
+            </a:lnRef>
+            <a:fillRef idx="1">
+              <a:schemeClr val="lt1"/>
+            </a:fillRef>
+            <a:effectRef idx="0">
+              <a:schemeClr val="accent6"/>
+            </a:effectRef>
+            <a:fontRef idx="minor">
+              <a:schemeClr val="dk1"/>
+            </a:fontRef>
+          </p:style>
+          <p:txBody>
+            <a:bodyPr rtlCol="0" anchor="ctr"/>
+            <a:lstStyle/>
+            <a:p>
+              <a:pPr algn="ctr"/>
+              <a:endParaRPr lang="en-US" i="1" dirty="0"/>
+            </a:p>
+          </p:txBody>
+        </p:sp>
+        <p:sp>
+          <p:nvSpPr>
+            <p:cNvPr id="51" name="Oval 50">
+              <a:extLst>
+                <a:ext uri="{FF2B5EF4-FFF2-40B4-BE49-F238E27FC236}">
+                  <a16:creationId xmlns:a16="http://schemas.microsoft.com/office/drawing/2014/main" id="{488A40C9-3C11-477D-B0FB-19648893F367}"/>
+                </a:ext>
+              </a:extLst>
+            </p:cNvPr>
+            <p:cNvSpPr/>
+            <p:nvPr/>
+          </p:nvSpPr>
+          <p:spPr>
+            <a:xfrm>
+              <a:off x="8336191" y="624781"/>
+              <a:ext cx="133350" cy="133350"/>
+            </a:xfrm>
+            <a:prstGeom prst="ellipse">
+              <a:avLst/>
+            </a:prstGeom>
+          </p:spPr>
+          <p:style>
+            <a:lnRef idx="2">
+              <a:schemeClr val="accent6"/>
+            </a:lnRef>
+            <a:fillRef idx="1">
+              <a:schemeClr val="lt1"/>
+            </a:fillRef>
+            <a:effectRef idx="0">
+              <a:schemeClr val="accent6"/>
+            </a:effectRef>
+            <a:fontRef idx="minor">
+              <a:schemeClr val="dk1"/>
+            </a:fontRef>
+          </p:style>
+          <p:txBody>
+            <a:bodyPr rtlCol="0" anchor="ctr"/>
+            <a:lstStyle/>
+            <a:p>
+              <a:pPr algn="ctr"/>
+              <a:endParaRPr lang="en-US" i="1" dirty="0"/>
+            </a:p>
+          </p:txBody>
+        </p:sp>
+      </p:grpSp>
+      <p:grpSp>
+        <p:nvGrpSpPr>
+          <p:cNvPr id="68" name="Group 67">
+            <a:extLst>
+              <a:ext uri="{FF2B5EF4-FFF2-40B4-BE49-F238E27FC236}">
+                <a16:creationId xmlns:a16="http://schemas.microsoft.com/office/drawing/2014/main" id="{4C38A914-7C5E-45DB-97BE-E79CA2ECD5F8}"/>
+              </a:ext>
+            </a:extLst>
+          </p:cNvPr>
+          <p:cNvGrpSpPr/>
+          <p:nvPr/>
+        </p:nvGrpSpPr>
+        <p:grpSpPr>
+          <a:xfrm>
+            <a:off x="6475751" y="1230807"/>
+            <a:ext cx="2842861" cy="436350"/>
+            <a:chOff x="7886238" y="1326460"/>
+            <a:chExt cx="2842861" cy="436350"/>
+          </a:xfrm>
+        </p:grpSpPr>
+        <p:cxnSp>
+          <p:nvCxnSpPr>
+            <p:cNvPr id="82" name="Straight Connector 81">
+              <a:extLst>
+                <a:ext uri="{FF2B5EF4-FFF2-40B4-BE49-F238E27FC236}">
+                  <a16:creationId xmlns:a16="http://schemas.microsoft.com/office/drawing/2014/main" id="{B6731E9E-AA0A-4051-B5CF-CCBE60A4E81A}"/>
+                </a:ext>
+              </a:extLst>
+            </p:cNvPr>
+            <p:cNvCxnSpPr>
+              <a:cxnSpLocks/>
+            </p:cNvCxnSpPr>
+            <p:nvPr/>
+          </p:nvCxnSpPr>
+          <p:spPr>
+            <a:xfrm>
+              <a:off x="7995775" y="1695792"/>
+              <a:ext cx="2604577" cy="0"/>
+            </a:xfrm>
+            <a:prstGeom prst="line">
+              <a:avLst/>
+            </a:prstGeom>
+            <a:ln cap="rnd"/>
+          </p:spPr>
+          <p:style>
+            <a:lnRef idx="3">
+              <a:schemeClr val="accent6"/>
+            </a:lnRef>
+            <a:fillRef idx="0">
+              <a:schemeClr val="accent6"/>
+            </a:fillRef>
+            <a:effectRef idx="2">
+              <a:schemeClr val="accent6"/>
+            </a:effectRef>
+            <a:fontRef idx="minor">
+              <a:schemeClr val="tx1"/>
+            </a:fontRef>
+          </p:style>
+        </p:cxnSp>
+        <p:sp>
+          <p:nvSpPr>
+            <p:cNvPr id="83" name="Oval 82">
+              <a:extLst>
+                <a:ext uri="{FF2B5EF4-FFF2-40B4-BE49-F238E27FC236}">
+                  <a16:creationId xmlns:a16="http://schemas.microsoft.com/office/drawing/2014/main" id="{FA465960-DB0D-46CD-8325-5B378A260064}"/>
+                </a:ext>
+              </a:extLst>
+            </p:cNvPr>
+            <p:cNvSpPr/>
+            <p:nvPr/>
+          </p:nvSpPr>
+          <p:spPr>
+            <a:xfrm>
+              <a:off x="7886238" y="1629460"/>
+              <a:ext cx="133350" cy="133350"/>
+            </a:xfrm>
+            <a:prstGeom prst="ellipse">
+              <a:avLst/>
+            </a:prstGeom>
+          </p:spPr>
+          <p:style>
+            <a:lnRef idx="2">
+              <a:schemeClr val="accent6"/>
+            </a:lnRef>
+            <a:fillRef idx="1">
+              <a:schemeClr val="lt1"/>
+            </a:fillRef>
+            <a:effectRef idx="0">
+              <a:schemeClr val="accent6"/>
+            </a:effectRef>
+            <a:fontRef idx="minor">
+              <a:schemeClr val="dk1"/>
+            </a:fontRef>
+          </p:style>
+          <p:txBody>
+            <a:bodyPr rtlCol="0" anchor="ctr"/>
+            <a:lstStyle/>
+            <a:p>
+              <a:pPr algn="ctr"/>
+              <a:endParaRPr lang="en-US"/>
+            </a:p>
+          </p:txBody>
+        </p:sp>
+        <p:sp>
+          <p:nvSpPr>
+            <p:cNvPr id="84" name="TextBox 83">
+              <a:extLst>
+                <a:ext uri="{FF2B5EF4-FFF2-40B4-BE49-F238E27FC236}">
+                  <a16:creationId xmlns:a16="http://schemas.microsoft.com/office/drawing/2014/main" id="{B9C48476-7589-496A-86FB-05340FA07230}"/>
+                </a:ext>
+              </a:extLst>
+            </p:cNvPr>
+            <p:cNvSpPr txBox="1"/>
+            <p:nvPr/>
+          </p:nvSpPr>
+          <p:spPr>
+            <a:xfrm>
+              <a:off x="7910051" y="1326460"/>
+              <a:ext cx="2819048" cy="369332"/>
+            </a:xfrm>
+            <a:prstGeom prst="rect">
+              <a:avLst/>
+            </a:prstGeom>
+            <a:noFill/>
+          </p:spPr>
+          <p:txBody>
+            <a:bodyPr wrap="square" rtlCol="0">
+              <a:spAutoFit/>
+            </a:bodyPr>
+            <a:lstStyle/>
+            <a:p>
+              <a:pPr algn="r"/>
+              <a:r>
+                <a:rPr lang="en-US" dirty="0">
+                  <a:solidFill>
+                    <a:schemeClr val="accent6">
+                      <a:lumMod val="75000"/>
+                    </a:schemeClr>
+                  </a:solidFill>
+                </a:rPr>
+                <a:t>Mice Button/Wheel Codes</a:t>
+              </a:r>
+            </a:p>
+          </p:txBody>
+        </p:sp>
+      </p:grpSp>
+      <p:cxnSp>
+        <p:nvCxnSpPr>
+          <p:cNvPr id="22" name="Straight Connector 21">
+            <a:extLst>
+              <a:ext uri="{FF2B5EF4-FFF2-40B4-BE49-F238E27FC236}">
+                <a16:creationId xmlns:a16="http://schemas.microsoft.com/office/drawing/2014/main" id="{281F65D4-8811-4C7C-9370-9FFB690657BE}"/>
+              </a:ext>
+            </a:extLst>
+          </p:cNvPr>
+          <p:cNvCxnSpPr>
+            <a:cxnSpLocks/>
+          </p:cNvCxnSpPr>
+          <p:nvPr/>
+        </p:nvCxnSpPr>
+        <p:spPr>
+          <a:xfrm flipH="1">
+            <a:off x="9797268" y="1995666"/>
+            <a:ext cx="1104900" cy="1"/>
+          </a:xfrm>
+          <a:prstGeom prst="line">
+            <a:avLst/>
+          </a:prstGeom>
+          <a:ln cap="rnd"/>
+        </p:spPr>
+        <p:style>
+          <a:lnRef idx="3">
+            <a:schemeClr val="accent6"/>
+          </a:lnRef>
+          <a:fillRef idx="0">
+            <a:schemeClr val="accent6"/>
+          </a:fillRef>
+          <a:effectRef idx="2">
+            <a:schemeClr val="accent6"/>
+          </a:effectRef>
+          <a:fontRef idx="minor">
+            <a:schemeClr val="tx1"/>
+          </a:fontRef>
+        </p:style>
+      </p:cxnSp>
+      <p:cxnSp>
+        <p:nvCxnSpPr>
+          <p:cNvPr id="23" name="Straight Connector 22">
+            <a:extLst>
+              <a:ext uri="{FF2B5EF4-FFF2-40B4-BE49-F238E27FC236}">
+                <a16:creationId xmlns:a16="http://schemas.microsoft.com/office/drawing/2014/main" id="{E0D3EF36-CFD1-4353-B6BE-50AEE339ED21}"/>
+              </a:ext>
+            </a:extLst>
+          </p:cNvPr>
+          <p:cNvCxnSpPr>
+            <a:cxnSpLocks/>
+            <a:endCxn id="24" idx="7"/>
+          </p:cNvCxnSpPr>
+          <p:nvPr/>
+        </p:nvCxnSpPr>
+        <p:spPr>
+          <a:xfrm flipH="1">
+            <a:off x="8867807" y="1995666"/>
+            <a:ext cx="912889" cy="452495"/>
+          </a:xfrm>
+          <a:prstGeom prst="line">
+            <a:avLst/>
+          </a:prstGeom>
+          <a:ln cap="rnd"/>
+        </p:spPr>
+        <p:style>
+          <a:lnRef idx="3">
+            <a:schemeClr val="accent6"/>
+          </a:lnRef>
+          <a:fillRef idx="0">
+            <a:schemeClr val="accent6"/>
+          </a:fillRef>
+          <a:effectRef idx="2">
+            <a:schemeClr val="accent6"/>
+          </a:effectRef>
+          <a:fontRef idx="minor">
+            <a:schemeClr val="tx1"/>
+          </a:fontRef>
+        </p:style>
+      </p:cxnSp>
+      <p:sp>
+        <p:nvSpPr>
+          <p:cNvPr id="24" name="Oval 23">
+            <a:extLst>
+              <a:ext uri="{FF2B5EF4-FFF2-40B4-BE49-F238E27FC236}">
+                <a16:creationId xmlns:a16="http://schemas.microsoft.com/office/drawing/2014/main" id="{9442696C-9BC0-478B-9CA9-E9EE6FB12287}"/>
+              </a:ext>
+            </a:extLst>
+          </p:cNvPr>
+          <p:cNvSpPr/>
+          <p:nvPr/>
+        </p:nvSpPr>
+        <p:spPr>
+          <a:xfrm>
+            <a:off x="8753986" y="2428632"/>
+            <a:ext cx="133350" cy="133350"/>
+          </a:xfrm>
+          <a:prstGeom prst="ellipse">
+            <a:avLst/>
+          </a:prstGeom>
+        </p:spPr>
+        <p:style>
+          <a:lnRef idx="2">
+            <a:schemeClr val="accent6"/>
+          </a:lnRef>
+          <a:fillRef idx="1">
+            <a:schemeClr val="lt1"/>
+          </a:fillRef>
+          <a:effectRef idx="0">
+            <a:schemeClr val="accent6"/>
+          </a:effectRef>
+          <a:fontRef idx="minor">
+            <a:schemeClr val="dk1"/>
+          </a:fontRef>
+        </p:style>
+        <p:txBody>
+          <a:bodyPr rtlCol="0" anchor="ctr"/>
+          <a:lstStyle/>
+          <a:p>
+            <a:pPr algn="ctr"/>
+            <a:endParaRPr lang="en-US"/>
+          </a:p>
+        </p:txBody>
+      </p:sp>
+      <p:sp>
+        <p:nvSpPr>
+          <p:cNvPr id="25" name="TextBox 24">
+            <a:extLst>
+              <a:ext uri="{FF2B5EF4-FFF2-40B4-BE49-F238E27FC236}">
+                <a16:creationId xmlns:a16="http://schemas.microsoft.com/office/drawing/2014/main" id="{5FD8137D-08BF-449C-AE7B-0500735A5E83}"/>
+              </a:ext>
+            </a:extLst>
+          </p:cNvPr>
+          <p:cNvSpPr txBox="1"/>
+          <p:nvPr/>
+        </p:nvSpPr>
+        <p:spPr>
+          <a:xfrm>
+            <a:off x="10170822" y="1640621"/>
+            <a:ext cx="979242" cy="369332"/>
+          </a:xfrm>
+          <a:prstGeom prst="rect">
+            <a:avLst/>
+          </a:prstGeom>
+          <a:noFill/>
+        </p:spPr>
+        <p:txBody>
+          <a:bodyPr wrap="none" rtlCol="0">
+            <a:spAutoFit/>
+          </a:bodyPr>
+          <a:lstStyle/>
+          <a:p>
+            <a:r>
+              <a:rPr lang="en-US" dirty="0">
+                <a:solidFill>
+                  <a:schemeClr val="accent6">
+                    <a:lumMod val="75000"/>
+                  </a:schemeClr>
+                </a:solidFill>
+              </a:rPr>
+              <a:t>2 (Right)</a:t>
+            </a:r>
+          </a:p>
+        </p:txBody>
+      </p:sp>
+      <p:cxnSp>
+        <p:nvCxnSpPr>
+          <p:cNvPr id="102" name="Straight Connector 101">
+            <a:extLst>
+              <a:ext uri="{FF2B5EF4-FFF2-40B4-BE49-F238E27FC236}">
+                <a16:creationId xmlns:a16="http://schemas.microsoft.com/office/drawing/2014/main" id="{4E269E96-58A5-4785-9FAC-7EE4DF2003F0}"/>
+              </a:ext>
+            </a:extLst>
+          </p:cNvPr>
+          <p:cNvCxnSpPr>
+            <a:cxnSpLocks/>
+            <a:endCxn id="103" idx="1"/>
+          </p:cNvCxnSpPr>
+          <p:nvPr/>
+        </p:nvCxnSpPr>
+        <p:spPr>
+          <a:xfrm>
+            <a:off x="6025141" y="2091695"/>
+            <a:ext cx="1276787" cy="465362"/>
+          </a:xfrm>
+          <a:prstGeom prst="line">
+            <a:avLst/>
+          </a:prstGeom>
+          <a:ln cap="rnd"/>
+        </p:spPr>
+        <p:style>
+          <a:lnRef idx="3">
+            <a:schemeClr val="accent6"/>
+          </a:lnRef>
+          <a:fillRef idx="0">
+            <a:schemeClr val="accent6"/>
+          </a:fillRef>
+          <a:effectRef idx="2">
+            <a:schemeClr val="accent6"/>
+          </a:effectRef>
+          <a:fontRef idx="minor">
+            <a:schemeClr val="tx1"/>
+          </a:fontRef>
+        </p:style>
+      </p:cxnSp>
+      <p:sp>
+        <p:nvSpPr>
+          <p:cNvPr id="103" name="Oval 102">
+            <a:extLst>
+              <a:ext uri="{FF2B5EF4-FFF2-40B4-BE49-F238E27FC236}">
+                <a16:creationId xmlns:a16="http://schemas.microsoft.com/office/drawing/2014/main" id="{A0BA6FF4-D3E0-4520-9B53-934742B8C999}"/>
+              </a:ext>
+            </a:extLst>
+          </p:cNvPr>
+          <p:cNvSpPr/>
+          <p:nvPr/>
+        </p:nvSpPr>
+        <p:spPr>
+          <a:xfrm>
+            <a:off x="7282399" y="2537528"/>
+            <a:ext cx="133350" cy="133350"/>
+          </a:xfrm>
+          <a:prstGeom prst="ellipse">
+            <a:avLst/>
+          </a:prstGeom>
+        </p:spPr>
+        <p:style>
+          <a:lnRef idx="2">
+            <a:schemeClr val="accent6"/>
+          </a:lnRef>
+          <a:fillRef idx="1">
+            <a:schemeClr val="lt1"/>
+          </a:fillRef>
+          <a:effectRef idx="0">
+            <a:schemeClr val="accent6"/>
+          </a:effectRef>
+          <a:fontRef idx="minor">
+            <a:schemeClr val="dk1"/>
+          </a:fontRef>
+        </p:style>
+        <p:txBody>
+          <a:bodyPr rtlCol="0" anchor="ctr"/>
+          <a:lstStyle/>
+          <a:p>
+            <a:pPr algn="ctr"/>
+            <a:endParaRPr lang="en-US"/>
+          </a:p>
+        </p:txBody>
+      </p:sp>
+      <p:sp>
+        <p:nvSpPr>
+          <p:cNvPr id="104" name="TextBox 103">
+            <a:extLst>
+              <a:ext uri="{FF2B5EF4-FFF2-40B4-BE49-F238E27FC236}">
+                <a16:creationId xmlns:a16="http://schemas.microsoft.com/office/drawing/2014/main" id="{30942C0E-A289-4793-855B-CBAAB0968354}"/>
+              </a:ext>
+            </a:extLst>
+          </p:cNvPr>
+          <p:cNvSpPr txBox="1"/>
+          <p:nvPr/>
+        </p:nvSpPr>
+        <p:spPr>
+          <a:xfrm>
+            <a:off x="5077588" y="1722363"/>
+            <a:ext cx="854273" cy="369332"/>
+          </a:xfrm>
+          <a:prstGeom prst="rect">
+            <a:avLst/>
+          </a:prstGeom>
+          <a:noFill/>
+        </p:spPr>
+        <p:txBody>
+          <a:bodyPr wrap="none" rtlCol="0">
+            <a:spAutoFit/>
+          </a:bodyPr>
+          <a:lstStyle/>
+          <a:p>
+            <a:r>
+              <a:rPr lang="en-US" dirty="0">
+                <a:solidFill>
+                  <a:schemeClr val="accent6">
+                    <a:lumMod val="75000"/>
+                  </a:schemeClr>
+                </a:solidFill>
+              </a:rPr>
+              <a:t>0 (Left)</a:t>
+            </a:r>
+          </a:p>
+        </p:txBody>
+      </p:sp>
+      <p:cxnSp>
+        <p:nvCxnSpPr>
+          <p:cNvPr id="105" name="Straight Connector 104">
+            <a:extLst>
+              <a:ext uri="{FF2B5EF4-FFF2-40B4-BE49-F238E27FC236}">
+                <a16:creationId xmlns:a16="http://schemas.microsoft.com/office/drawing/2014/main" id="{938F731D-4026-48E1-9F8E-FF1DCA8F0E7A}"/>
+              </a:ext>
+            </a:extLst>
+          </p:cNvPr>
+          <p:cNvCxnSpPr>
+            <a:cxnSpLocks/>
+          </p:cNvCxnSpPr>
+          <p:nvPr/>
+        </p:nvCxnSpPr>
+        <p:spPr>
+          <a:xfrm flipH="1">
+            <a:off x="5116368" y="2091695"/>
+            <a:ext cx="908773" cy="0"/>
+          </a:xfrm>
+          <a:prstGeom prst="line">
+            <a:avLst/>
+          </a:prstGeom>
+          <a:ln cap="rnd"/>
+        </p:spPr>
+        <p:style>
+          <a:lnRef idx="3">
+            <a:schemeClr val="accent6"/>
+          </a:lnRef>
+          <a:fillRef idx="0">
+            <a:schemeClr val="accent6"/>
+          </a:fillRef>
+          <a:effectRef idx="2">
+            <a:schemeClr val="accent6"/>
+          </a:effectRef>
+          <a:fontRef idx="minor">
+            <a:schemeClr val="tx1"/>
+          </a:fontRef>
+        </p:style>
+      </p:cxnSp>
+      <p:cxnSp>
+        <p:nvCxnSpPr>
+          <p:cNvPr id="112" name="Straight Connector 111">
+            <a:extLst>
+              <a:ext uri="{FF2B5EF4-FFF2-40B4-BE49-F238E27FC236}">
+                <a16:creationId xmlns:a16="http://schemas.microsoft.com/office/drawing/2014/main" id="{2754A116-FEFB-4527-A3BC-81BC0002745D}"/>
+              </a:ext>
+            </a:extLst>
+          </p:cNvPr>
+          <p:cNvCxnSpPr>
+            <a:cxnSpLocks/>
+          </p:cNvCxnSpPr>
+          <p:nvPr/>
+        </p:nvCxnSpPr>
+        <p:spPr>
+          <a:xfrm>
+            <a:off x="10382369" y="3613766"/>
+            <a:ext cx="1388656" cy="0"/>
+          </a:xfrm>
+          <a:prstGeom prst="line">
+            <a:avLst/>
+          </a:prstGeom>
+          <a:ln cap="rnd"/>
+        </p:spPr>
+        <p:style>
+          <a:lnRef idx="3">
+            <a:schemeClr val="accent6"/>
+          </a:lnRef>
+          <a:fillRef idx="0">
+            <a:schemeClr val="accent6"/>
+          </a:fillRef>
+          <a:effectRef idx="2">
+            <a:schemeClr val="accent6"/>
+          </a:effectRef>
+          <a:fontRef idx="minor">
+            <a:schemeClr val="tx1"/>
+          </a:fontRef>
+        </p:style>
+      </p:cxnSp>
+      <p:cxnSp>
+        <p:nvCxnSpPr>
+          <p:cNvPr id="113" name="Straight Connector 112">
+            <a:extLst>
+              <a:ext uri="{FF2B5EF4-FFF2-40B4-BE49-F238E27FC236}">
+                <a16:creationId xmlns:a16="http://schemas.microsoft.com/office/drawing/2014/main" id="{3D5005AC-F2CA-494B-8F5E-DA017EF79109}"/>
+              </a:ext>
+            </a:extLst>
+          </p:cNvPr>
+          <p:cNvCxnSpPr>
+            <a:cxnSpLocks/>
+            <a:endCxn id="114" idx="5"/>
+          </p:cNvCxnSpPr>
+          <p:nvPr/>
+        </p:nvCxnSpPr>
+        <p:spPr>
+          <a:xfrm flipH="1" flipV="1">
+            <a:off x="8306742" y="3050697"/>
+            <a:ext cx="2075627" cy="563069"/>
+          </a:xfrm>
+          <a:prstGeom prst="line">
+            <a:avLst/>
+          </a:prstGeom>
+          <a:ln cap="rnd"/>
+        </p:spPr>
+        <p:style>
+          <a:lnRef idx="3">
+            <a:schemeClr val="accent6"/>
+          </a:lnRef>
+          <a:fillRef idx="0">
+            <a:schemeClr val="accent6"/>
+          </a:fillRef>
+          <a:effectRef idx="2">
+            <a:schemeClr val="accent6"/>
+          </a:effectRef>
+          <a:fontRef idx="minor">
+            <a:schemeClr val="tx1"/>
+          </a:fontRef>
+        </p:style>
+      </p:cxnSp>
+      <p:sp>
+        <p:nvSpPr>
+          <p:cNvPr id="114" name="Oval 113">
+            <a:extLst>
+              <a:ext uri="{FF2B5EF4-FFF2-40B4-BE49-F238E27FC236}">
+                <a16:creationId xmlns:a16="http://schemas.microsoft.com/office/drawing/2014/main" id="{D414E2CD-8896-424A-988A-D237AF2F1D08}"/>
+              </a:ext>
+            </a:extLst>
+          </p:cNvPr>
+          <p:cNvSpPr/>
+          <p:nvPr/>
+        </p:nvSpPr>
+        <p:spPr>
+          <a:xfrm>
+            <a:off x="8192921" y="2936876"/>
+            <a:ext cx="133350" cy="133350"/>
+          </a:xfrm>
+          <a:prstGeom prst="ellipse">
+            <a:avLst/>
+          </a:prstGeom>
+        </p:spPr>
+        <p:style>
+          <a:lnRef idx="2">
+            <a:schemeClr val="accent6"/>
+          </a:lnRef>
+          <a:fillRef idx="1">
+            <a:schemeClr val="lt1"/>
+          </a:fillRef>
+          <a:effectRef idx="0">
+            <a:schemeClr val="accent6"/>
+          </a:effectRef>
+          <a:fontRef idx="minor">
+            <a:schemeClr val="dk1"/>
+          </a:fontRef>
+        </p:style>
+        <p:txBody>
+          <a:bodyPr rtlCol="0" anchor="ctr"/>
+          <a:lstStyle/>
+          <a:p>
+            <a:pPr algn="ctr"/>
+            <a:endParaRPr lang="en-US"/>
+          </a:p>
+        </p:txBody>
+      </p:sp>
+      <p:sp>
+        <p:nvSpPr>
+          <p:cNvPr id="115" name="TextBox 114">
+            <a:extLst>
+              <a:ext uri="{FF2B5EF4-FFF2-40B4-BE49-F238E27FC236}">
+                <a16:creationId xmlns:a16="http://schemas.microsoft.com/office/drawing/2014/main" id="{D21304A2-B721-4941-86A9-F8BE1B5EDF39}"/>
+              </a:ext>
+            </a:extLst>
+          </p:cNvPr>
+          <p:cNvSpPr txBox="1"/>
+          <p:nvPr/>
+        </p:nvSpPr>
+        <p:spPr>
+          <a:xfrm>
+            <a:off x="10245147" y="3230148"/>
+            <a:ext cx="1641796" cy="369332"/>
+          </a:xfrm>
+          <a:prstGeom prst="rect">
+            <a:avLst/>
+          </a:prstGeom>
+          <a:noFill/>
+        </p:spPr>
+        <p:txBody>
+          <a:bodyPr wrap="none" rtlCol="0">
+            <a:spAutoFit/>
+          </a:bodyPr>
+          <a:lstStyle/>
+          <a:p>
+            <a:r>
+              <a:rPr lang="en-US" dirty="0">
+                <a:solidFill>
+                  <a:schemeClr val="accent6">
+                    <a:lumMod val="75000"/>
+                  </a:schemeClr>
+                </a:solidFill>
+              </a:rPr>
+              <a:t>1 (Middle Click)</a:t>
+            </a:r>
+          </a:p>
+        </p:txBody>
+      </p:sp>
+      <p:sp>
+        <p:nvSpPr>
+          <p:cNvPr id="56" name="TextBox 55">
+            <a:extLst>
+              <a:ext uri="{FF2B5EF4-FFF2-40B4-BE49-F238E27FC236}">
+                <a16:creationId xmlns:a16="http://schemas.microsoft.com/office/drawing/2014/main" id="{DC9E2662-5E83-424E-A577-4BDD9D1941B9}"/>
+              </a:ext>
+            </a:extLst>
+          </p:cNvPr>
+          <p:cNvSpPr txBox="1"/>
+          <p:nvPr/>
+        </p:nvSpPr>
+        <p:spPr>
+          <a:xfrm>
+            <a:off x="420975" y="1571045"/>
+            <a:ext cx="2377061" cy="2215991"/>
+          </a:xfrm>
+          <a:prstGeom prst="rect">
+            <a:avLst/>
+          </a:prstGeom>
+          <a:noFill/>
+        </p:spPr>
+        <p:txBody>
+          <a:bodyPr wrap="none" rtlCol="0">
+            <a:spAutoFit/>
+          </a:bodyPr>
+          <a:lstStyle/>
+          <a:p>
+            <a:r>
+              <a:rPr lang="en-US" dirty="0" err="1"/>
+              <a:t>event.screen</a:t>
+            </a:r>
+            <a:r>
+              <a:rPr lang="en-US" dirty="0"/>
+              <a:t>[X/Y] </a:t>
+            </a:r>
+          </a:p>
+          <a:p>
+            <a:r>
+              <a:rPr lang="en-US" sz="1200" dirty="0">
+                <a:solidFill>
+                  <a:schemeClr val="bg1">
+                    <a:lumMod val="50000"/>
+                  </a:schemeClr>
+                </a:solidFill>
+              </a:rPr>
+              <a:t>Double</a:t>
+            </a:r>
+          </a:p>
+          <a:p>
+            <a:endParaRPr lang="en-US" sz="600" dirty="0">
+              <a:solidFill>
+                <a:schemeClr val="bg1">
+                  <a:lumMod val="50000"/>
+                </a:schemeClr>
+              </a:solidFill>
+            </a:endParaRPr>
+          </a:p>
+          <a:p>
+            <a:r>
+              <a:rPr lang="en-US" dirty="0" err="1"/>
+              <a:t>event.client</a:t>
+            </a:r>
+            <a:r>
+              <a:rPr lang="en-US" dirty="0"/>
+              <a:t>[X/Y]</a:t>
+            </a:r>
+          </a:p>
+          <a:p>
+            <a:pPr lvl="0"/>
+            <a:r>
+              <a:rPr lang="en-US" sz="1200" dirty="0">
+                <a:solidFill>
+                  <a:prstClr val="white">
+                    <a:lumMod val="50000"/>
+                  </a:prstClr>
+                </a:solidFill>
+              </a:rPr>
+              <a:t>Double</a:t>
+            </a:r>
+          </a:p>
+          <a:p>
+            <a:r>
+              <a:rPr lang="en-US" sz="600" dirty="0"/>
+              <a:t> </a:t>
+            </a:r>
+          </a:p>
+          <a:p>
+            <a:r>
+              <a:rPr lang="en-US" dirty="0" err="1"/>
+              <a:t>event.offset</a:t>
+            </a:r>
+            <a:r>
+              <a:rPr lang="en-US" dirty="0"/>
+              <a:t>[X/Y] </a:t>
+            </a:r>
+          </a:p>
+          <a:p>
+            <a:pPr lvl="0"/>
+            <a:r>
+              <a:rPr lang="en-US" sz="1200" dirty="0">
+                <a:solidFill>
+                  <a:prstClr val="white">
+                    <a:lumMod val="50000"/>
+                  </a:prstClr>
+                </a:solidFill>
+              </a:rPr>
+              <a:t>Double</a:t>
+            </a:r>
+          </a:p>
+          <a:p>
+            <a:endParaRPr lang="en-US" sz="600" dirty="0"/>
+          </a:p>
+          <a:p>
+            <a:r>
+              <a:rPr lang="en-US" dirty="0"/>
+              <a:t>event.[ctrl/alt/shift]Key</a:t>
+            </a:r>
+          </a:p>
+          <a:p>
+            <a:pPr lvl="0"/>
+            <a:r>
+              <a:rPr lang="en-US" sz="1200" dirty="0">
+                <a:solidFill>
+                  <a:prstClr val="white">
+                    <a:lumMod val="50000"/>
+                  </a:prstClr>
+                </a:solidFill>
+              </a:rPr>
+              <a:t>Boolean</a:t>
+            </a:r>
+            <a:endParaRPr lang="en-US" dirty="0"/>
+          </a:p>
+        </p:txBody>
+      </p:sp>
+      <p:sp>
+        <p:nvSpPr>
+          <p:cNvPr id="10" name="Arrow: Up-Down 9">
+            <a:extLst>
+              <a:ext uri="{FF2B5EF4-FFF2-40B4-BE49-F238E27FC236}">
+                <a16:creationId xmlns:a16="http://schemas.microsoft.com/office/drawing/2014/main" id="{8B5B0B1F-23CB-4DCF-BA03-911F3C641D93}"/>
+              </a:ext>
+            </a:extLst>
+          </p:cNvPr>
+          <p:cNvSpPr/>
+          <p:nvPr/>
+        </p:nvSpPr>
+        <p:spPr>
+          <a:xfrm>
+            <a:off x="7897182" y="2537528"/>
+            <a:ext cx="275007" cy="950419"/>
+          </a:xfrm>
+          <a:prstGeom prst="upDownArrow">
+            <a:avLst>
+              <a:gd name="adj1" fmla="val 50000"/>
+              <a:gd name="adj2" fmla="val 89254"/>
+            </a:avLst>
+          </a:prstGeom>
+          <a:solidFill>
+            <a:schemeClr val="bg1"/>
+          </a:solidFill>
+          <a:ln w="19050"/>
+        </p:spPr>
+        <p:style>
+          <a:lnRef idx="2">
+            <a:schemeClr val="accent6">
+              <a:shade val="50000"/>
+            </a:schemeClr>
+          </a:lnRef>
+          <a:fillRef idx="1">
+            <a:schemeClr val="accent6"/>
+          </a:fillRef>
+          <a:effectRef idx="0">
+            <a:schemeClr val="accent6"/>
+          </a:effectRef>
+          <a:fontRef idx="minor">
+            <a:schemeClr val="lt1"/>
+          </a:fontRef>
+        </p:style>
+        <p:txBody>
+          <a:bodyPr rtlCol="0" anchor="ctr"/>
+          <a:lstStyle/>
+          <a:p>
+            <a:pPr algn="ctr"/>
+            <a:endParaRPr lang="en-US"/>
+          </a:p>
+        </p:txBody>
+      </p:sp>
+      <p:cxnSp>
+        <p:nvCxnSpPr>
+          <p:cNvPr id="57" name="Straight Connector 56">
+            <a:extLst>
+              <a:ext uri="{FF2B5EF4-FFF2-40B4-BE49-F238E27FC236}">
+                <a16:creationId xmlns:a16="http://schemas.microsoft.com/office/drawing/2014/main" id="{A2D0FD45-24DC-44C9-95A8-11CF09E25E9E}"/>
+              </a:ext>
+            </a:extLst>
+          </p:cNvPr>
+          <p:cNvCxnSpPr>
+            <a:cxnSpLocks/>
+          </p:cNvCxnSpPr>
+          <p:nvPr/>
+        </p:nvCxnSpPr>
+        <p:spPr>
+          <a:xfrm>
+            <a:off x="4873663" y="4107574"/>
+            <a:ext cx="1388656" cy="0"/>
+          </a:xfrm>
+          <a:prstGeom prst="line">
+            <a:avLst/>
+          </a:prstGeom>
+          <a:ln cap="rnd"/>
+        </p:spPr>
+        <p:style>
+          <a:lnRef idx="3">
+            <a:schemeClr val="accent6"/>
+          </a:lnRef>
+          <a:fillRef idx="0">
+            <a:schemeClr val="accent6"/>
+          </a:fillRef>
+          <a:effectRef idx="2">
+            <a:schemeClr val="accent6"/>
+          </a:effectRef>
+          <a:fontRef idx="minor">
+            <a:schemeClr val="tx1"/>
+          </a:fontRef>
+        </p:style>
+      </p:cxnSp>
+      <p:cxnSp>
+        <p:nvCxnSpPr>
+          <p:cNvPr id="58" name="Straight Connector 57">
+            <a:extLst>
+              <a:ext uri="{FF2B5EF4-FFF2-40B4-BE49-F238E27FC236}">
+                <a16:creationId xmlns:a16="http://schemas.microsoft.com/office/drawing/2014/main" id="{61165193-8D8A-4356-9A40-123AB273F08C}"/>
+              </a:ext>
+            </a:extLst>
+          </p:cNvPr>
+          <p:cNvCxnSpPr>
+            <a:cxnSpLocks/>
+            <a:endCxn id="10" idx="2"/>
+          </p:cNvCxnSpPr>
+          <p:nvPr/>
+        </p:nvCxnSpPr>
+        <p:spPr>
+          <a:xfrm flipV="1">
+            <a:off x="6282912" y="3012738"/>
+            <a:ext cx="1683022" cy="1094836"/>
+          </a:xfrm>
+          <a:prstGeom prst="line">
+            <a:avLst/>
+          </a:prstGeom>
+          <a:ln cap="rnd"/>
+        </p:spPr>
+        <p:style>
+          <a:lnRef idx="3">
+            <a:schemeClr val="accent6"/>
+          </a:lnRef>
+          <a:fillRef idx="0">
+            <a:schemeClr val="accent6"/>
+          </a:fillRef>
+          <a:effectRef idx="2">
+            <a:schemeClr val="accent6"/>
+          </a:effectRef>
+          <a:fontRef idx="minor">
+            <a:schemeClr val="tx1"/>
+          </a:fontRef>
+        </p:style>
+      </p:cxnSp>
+      <p:sp>
+        <p:nvSpPr>
+          <p:cNvPr id="59" name="TextBox 58">
+            <a:extLst>
+              <a:ext uri="{FF2B5EF4-FFF2-40B4-BE49-F238E27FC236}">
+                <a16:creationId xmlns:a16="http://schemas.microsoft.com/office/drawing/2014/main" id="{455BE79C-49BE-47E2-BD9D-9AF32A2E7269}"/>
+              </a:ext>
+            </a:extLst>
+          </p:cNvPr>
+          <p:cNvSpPr txBox="1"/>
+          <p:nvPr/>
+        </p:nvSpPr>
+        <p:spPr>
+          <a:xfrm>
+            <a:off x="4796241" y="3733337"/>
+            <a:ext cx="771750" cy="369332"/>
+          </a:xfrm>
+          <a:prstGeom prst="rect">
+            <a:avLst/>
+          </a:prstGeom>
+          <a:noFill/>
+        </p:spPr>
+        <p:txBody>
+          <a:bodyPr wrap="none" rtlCol="0">
+            <a:spAutoFit/>
+          </a:bodyPr>
+          <a:lstStyle/>
+          <a:p>
+            <a:r>
+              <a:rPr lang="en-US" dirty="0" err="1">
+                <a:solidFill>
+                  <a:schemeClr val="accent6">
+                    <a:lumMod val="75000"/>
+                  </a:schemeClr>
+                </a:solidFill>
+              </a:rPr>
+              <a:t>deltaY</a:t>
+            </a:r>
+            <a:endParaRPr lang="en-US" dirty="0">
+              <a:solidFill>
+                <a:schemeClr val="accent6">
+                  <a:lumMod val="75000"/>
+                </a:schemeClr>
+              </a:solidFill>
+            </a:endParaRPr>
+          </a:p>
+        </p:txBody>
+      </p:sp>
+      <p:sp>
+        <p:nvSpPr>
+          <p:cNvPr id="64" name="TextBox 63">
+            <a:extLst>
+              <a:ext uri="{FF2B5EF4-FFF2-40B4-BE49-F238E27FC236}">
+                <a16:creationId xmlns:a16="http://schemas.microsoft.com/office/drawing/2014/main" id="{6A8FDF56-608E-4EBA-8028-7D990B63A79E}"/>
+              </a:ext>
+            </a:extLst>
+          </p:cNvPr>
+          <p:cNvSpPr txBox="1"/>
+          <p:nvPr/>
+        </p:nvSpPr>
+        <p:spPr>
+          <a:xfrm>
+            <a:off x="4810138" y="4156794"/>
+            <a:ext cx="1112869" cy="1107996"/>
+          </a:xfrm>
+          <a:prstGeom prst="rect">
+            <a:avLst/>
+          </a:prstGeom>
+          <a:noFill/>
+        </p:spPr>
+        <p:txBody>
+          <a:bodyPr wrap="none" rtlCol="0">
+            <a:spAutoFit/>
+          </a:bodyPr>
+          <a:lstStyle/>
+          <a:p>
+            <a:r>
+              <a:rPr lang="en-US" dirty="0"/>
+              <a:t>Up</a:t>
+            </a:r>
+          </a:p>
+          <a:p>
+            <a:r>
+              <a:rPr lang="en-US" sz="1200" dirty="0">
+                <a:solidFill>
+                  <a:schemeClr val="bg1">
+                    <a:lumMod val="50000"/>
+                  </a:schemeClr>
+                </a:solidFill>
+              </a:rPr>
+              <a:t>Negative Value</a:t>
+            </a:r>
+          </a:p>
+          <a:p>
+            <a:endParaRPr lang="en-US" sz="600" dirty="0">
+              <a:solidFill>
+                <a:schemeClr val="bg1">
+                  <a:lumMod val="50000"/>
+                </a:schemeClr>
+              </a:solidFill>
+            </a:endParaRPr>
+          </a:p>
+          <a:p>
+            <a:r>
+              <a:rPr lang="en-US" dirty="0"/>
+              <a:t>Down </a:t>
+            </a:r>
+          </a:p>
+          <a:p>
+            <a:r>
+              <a:rPr lang="en-US" sz="1200" dirty="0">
+                <a:solidFill>
+                  <a:schemeClr val="bg1">
+                    <a:lumMod val="50000"/>
+                  </a:schemeClr>
+                </a:solidFill>
+              </a:rPr>
+              <a:t>Positive Value</a:t>
+            </a:r>
+          </a:p>
+        </p:txBody>
+      </p:sp>
+      <p:cxnSp>
+        <p:nvCxnSpPr>
+          <p:cNvPr id="66" name="Straight Connector 65">
+            <a:extLst>
+              <a:ext uri="{FF2B5EF4-FFF2-40B4-BE49-F238E27FC236}">
+                <a16:creationId xmlns:a16="http://schemas.microsoft.com/office/drawing/2014/main" id="{E245109A-2AD5-4B91-B9B3-CD8BCD73FE79}"/>
+              </a:ext>
+            </a:extLst>
+          </p:cNvPr>
+          <p:cNvCxnSpPr>
+            <a:cxnSpLocks/>
+          </p:cNvCxnSpPr>
+          <p:nvPr/>
+        </p:nvCxnSpPr>
+        <p:spPr>
+          <a:xfrm flipV="1">
+            <a:off x="523651" y="4265805"/>
+            <a:ext cx="2398330" cy="19052"/>
+          </a:xfrm>
+          <a:prstGeom prst="line">
+            <a:avLst/>
+          </a:prstGeom>
+          <a:ln cap="rnd"/>
+        </p:spPr>
+        <p:style>
+          <a:lnRef idx="3">
+            <a:schemeClr val="accent6"/>
+          </a:lnRef>
+          <a:fillRef idx="0">
+            <a:schemeClr val="accent6"/>
+          </a:fillRef>
+          <a:effectRef idx="2">
+            <a:schemeClr val="accent6"/>
+          </a:effectRef>
+          <a:fontRef idx="minor">
+            <a:schemeClr val="tx1"/>
+          </a:fontRef>
+        </p:style>
+      </p:cxnSp>
+      <p:sp>
+        <p:nvSpPr>
+          <p:cNvPr id="69" name="Oval 68">
+            <a:extLst>
+              <a:ext uri="{FF2B5EF4-FFF2-40B4-BE49-F238E27FC236}">
+                <a16:creationId xmlns:a16="http://schemas.microsoft.com/office/drawing/2014/main" id="{E908D9D9-422D-4702-AA76-23CE8352484B}"/>
+              </a:ext>
+            </a:extLst>
+          </p:cNvPr>
+          <p:cNvSpPr/>
+          <p:nvPr/>
+        </p:nvSpPr>
+        <p:spPr>
+          <a:xfrm>
+            <a:off x="2915321" y="4208656"/>
+            <a:ext cx="133350" cy="133350"/>
+          </a:xfrm>
+          <a:prstGeom prst="ellipse">
+            <a:avLst/>
+          </a:prstGeom>
+        </p:spPr>
+        <p:style>
+          <a:lnRef idx="2">
+            <a:schemeClr val="accent6"/>
+          </a:lnRef>
+          <a:fillRef idx="1">
+            <a:schemeClr val="lt1"/>
+          </a:fillRef>
+          <a:effectRef idx="0">
+            <a:schemeClr val="accent6"/>
+          </a:effectRef>
+          <a:fontRef idx="minor">
+            <a:schemeClr val="dk1"/>
+          </a:fontRef>
+        </p:style>
+        <p:txBody>
+          <a:bodyPr rtlCol="0" anchor="ctr"/>
+          <a:lstStyle/>
+          <a:p>
+            <a:pPr algn="ctr"/>
+            <a:endParaRPr lang="en-US"/>
+          </a:p>
+        </p:txBody>
+      </p:sp>
+      <p:sp>
+        <p:nvSpPr>
+          <p:cNvPr id="70" name="TextBox 69">
+            <a:extLst>
+              <a:ext uri="{FF2B5EF4-FFF2-40B4-BE49-F238E27FC236}">
+                <a16:creationId xmlns:a16="http://schemas.microsoft.com/office/drawing/2014/main" id="{8913C5C4-95A9-4D75-8884-BD8B709ED923}"/>
+              </a:ext>
+            </a:extLst>
+          </p:cNvPr>
+          <p:cNvSpPr txBox="1"/>
+          <p:nvPr/>
+        </p:nvSpPr>
+        <p:spPr>
+          <a:xfrm>
+            <a:off x="437927" y="3896473"/>
+            <a:ext cx="2794355" cy="369332"/>
+          </a:xfrm>
+          <a:prstGeom prst="rect">
+            <a:avLst/>
+          </a:prstGeom>
+          <a:noFill/>
+        </p:spPr>
+        <p:txBody>
+          <a:bodyPr wrap="none" rtlCol="0">
+            <a:spAutoFit/>
+          </a:bodyPr>
+          <a:lstStyle/>
+          <a:p>
+            <a:r>
+              <a:rPr lang="en-US" dirty="0" err="1">
+                <a:solidFill>
+                  <a:schemeClr val="accent6">
+                    <a:lumMod val="75000"/>
+                  </a:schemeClr>
+                </a:solidFill>
+              </a:rPr>
+              <a:t>onMouse</a:t>
+            </a:r>
+            <a:r>
+              <a:rPr lang="en-US" dirty="0">
+                <a:solidFill>
+                  <a:schemeClr val="accent6">
+                    <a:lumMod val="75000"/>
+                  </a:schemeClr>
+                </a:solidFill>
+              </a:rPr>
+              <a:t>[Down/Up](event)</a:t>
+            </a:r>
+          </a:p>
+        </p:txBody>
+      </p:sp>
+      <p:sp>
+        <p:nvSpPr>
+          <p:cNvPr id="71" name="TextBox 70">
+            <a:extLst>
+              <a:ext uri="{FF2B5EF4-FFF2-40B4-BE49-F238E27FC236}">
+                <a16:creationId xmlns:a16="http://schemas.microsoft.com/office/drawing/2014/main" id="{FE0400C1-D2BB-4E4F-9847-A9E324F6AF88}"/>
+              </a:ext>
+            </a:extLst>
+          </p:cNvPr>
+          <p:cNvSpPr txBox="1"/>
+          <p:nvPr/>
+        </p:nvSpPr>
+        <p:spPr>
+          <a:xfrm>
+            <a:off x="435501" y="4394294"/>
+            <a:ext cx="1085554" cy="553998"/>
+          </a:xfrm>
+          <a:prstGeom prst="rect">
+            <a:avLst/>
+          </a:prstGeom>
+          <a:noFill/>
+        </p:spPr>
+        <p:txBody>
+          <a:bodyPr wrap="none" rtlCol="0">
+            <a:spAutoFit/>
+          </a:bodyPr>
+          <a:lstStyle/>
+          <a:p>
+            <a:r>
+              <a:rPr lang="en-US" dirty="0" err="1"/>
+              <a:t>event.key</a:t>
+            </a:r>
+            <a:endParaRPr lang="en-US" dirty="0"/>
+          </a:p>
+          <a:p>
+            <a:r>
+              <a:rPr lang="en-US" sz="1200" dirty="0">
+                <a:solidFill>
+                  <a:schemeClr val="bg1">
+                    <a:lumMod val="50000"/>
+                  </a:schemeClr>
+                </a:solidFill>
+              </a:rPr>
+              <a:t>Button Code</a:t>
+            </a:r>
+            <a:endParaRPr lang="en-US" dirty="0"/>
+          </a:p>
+        </p:txBody>
+      </p:sp>
+      <p:cxnSp>
+        <p:nvCxnSpPr>
+          <p:cNvPr id="72" name="Straight Connector 71">
+            <a:extLst>
+              <a:ext uri="{FF2B5EF4-FFF2-40B4-BE49-F238E27FC236}">
+                <a16:creationId xmlns:a16="http://schemas.microsoft.com/office/drawing/2014/main" id="{1D4F2023-9027-45AD-A24F-24D4F75CA17B}"/>
+              </a:ext>
+            </a:extLst>
+          </p:cNvPr>
+          <p:cNvCxnSpPr>
+            <a:cxnSpLocks/>
+          </p:cNvCxnSpPr>
+          <p:nvPr/>
+        </p:nvCxnSpPr>
+        <p:spPr>
+          <a:xfrm flipV="1">
+            <a:off x="509125" y="5439689"/>
+            <a:ext cx="2398330" cy="19052"/>
+          </a:xfrm>
+          <a:prstGeom prst="line">
+            <a:avLst/>
+          </a:prstGeom>
+          <a:ln cap="rnd"/>
+        </p:spPr>
+        <p:style>
+          <a:lnRef idx="3">
+            <a:schemeClr val="accent6"/>
+          </a:lnRef>
+          <a:fillRef idx="0">
+            <a:schemeClr val="accent6"/>
+          </a:fillRef>
+          <a:effectRef idx="2">
+            <a:schemeClr val="accent6"/>
+          </a:effectRef>
+          <a:fontRef idx="minor">
+            <a:schemeClr val="tx1"/>
+          </a:fontRef>
+        </p:style>
+      </p:cxnSp>
+      <p:sp>
+        <p:nvSpPr>
+          <p:cNvPr id="73" name="Oval 72">
+            <a:extLst>
+              <a:ext uri="{FF2B5EF4-FFF2-40B4-BE49-F238E27FC236}">
+                <a16:creationId xmlns:a16="http://schemas.microsoft.com/office/drawing/2014/main" id="{7AC319D9-C845-4DA3-9E11-48A64BD327B3}"/>
+              </a:ext>
+            </a:extLst>
+          </p:cNvPr>
+          <p:cNvSpPr/>
+          <p:nvPr/>
+        </p:nvSpPr>
+        <p:spPr>
+          <a:xfrm>
+            <a:off x="2900795" y="5382540"/>
+            <a:ext cx="133350" cy="133350"/>
+          </a:xfrm>
+          <a:prstGeom prst="ellipse">
+            <a:avLst/>
+          </a:prstGeom>
+        </p:spPr>
+        <p:style>
+          <a:lnRef idx="2">
+            <a:schemeClr val="accent6"/>
+          </a:lnRef>
+          <a:fillRef idx="1">
+            <a:schemeClr val="lt1"/>
+          </a:fillRef>
+          <a:effectRef idx="0">
+            <a:schemeClr val="accent6"/>
+          </a:effectRef>
+          <a:fontRef idx="minor">
+            <a:schemeClr val="dk1"/>
+          </a:fontRef>
+        </p:style>
+        <p:txBody>
+          <a:bodyPr rtlCol="0" anchor="ctr"/>
+          <a:lstStyle/>
+          <a:p>
+            <a:pPr algn="ctr"/>
+            <a:endParaRPr lang="en-US"/>
+          </a:p>
+        </p:txBody>
+      </p:sp>
+      <p:sp>
+        <p:nvSpPr>
+          <p:cNvPr id="74" name="TextBox 73">
+            <a:extLst>
+              <a:ext uri="{FF2B5EF4-FFF2-40B4-BE49-F238E27FC236}">
+                <a16:creationId xmlns:a16="http://schemas.microsoft.com/office/drawing/2014/main" id="{5CDC61E9-9998-4421-8777-E25334A56001}"/>
+              </a:ext>
+            </a:extLst>
+          </p:cNvPr>
+          <p:cNvSpPr txBox="1"/>
+          <p:nvPr/>
+        </p:nvSpPr>
+        <p:spPr>
+          <a:xfrm>
+            <a:off x="423401" y="5070357"/>
+            <a:ext cx="2354427" cy="369332"/>
+          </a:xfrm>
+          <a:prstGeom prst="rect">
+            <a:avLst/>
+          </a:prstGeom>
+          <a:noFill/>
+        </p:spPr>
+        <p:txBody>
+          <a:bodyPr wrap="none" rtlCol="0">
+            <a:spAutoFit/>
+          </a:bodyPr>
+          <a:lstStyle/>
+          <a:p>
+            <a:r>
+              <a:rPr lang="en-US" dirty="0" err="1">
+                <a:solidFill>
+                  <a:schemeClr val="accent6">
+                    <a:lumMod val="75000"/>
+                  </a:schemeClr>
+                </a:solidFill>
+              </a:rPr>
+              <a:t>onMouseWheel</a:t>
+            </a:r>
+            <a:r>
+              <a:rPr lang="en-US" dirty="0">
+                <a:solidFill>
+                  <a:schemeClr val="accent6">
+                    <a:lumMod val="75000"/>
+                  </a:schemeClr>
+                </a:solidFill>
+              </a:rPr>
+              <a:t>(event)</a:t>
+            </a:r>
+          </a:p>
+        </p:txBody>
+      </p:sp>
+      <p:sp>
+        <p:nvSpPr>
+          <p:cNvPr id="75" name="TextBox 74">
+            <a:extLst>
+              <a:ext uri="{FF2B5EF4-FFF2-40B4-BE49-F238E27FC236}">
+                <a16:creationId xmlns:a16="http://schemas.microsoft.com/office/drawing/2014/main" id="{D2D2177E-5D40-4824-9945-F584CE9CAE6F}"/>
+              </a:ext>
+            </a:extLst>
+          </p:cNvPr>
+          <p:cNvSpPr txBox="1"/>
+          <p:nvPr/>
+        </p:nvSpPr>
+        <p:spPr>
+          <a:xfrm>
+            <a:off x="420975" y="5568178"/>
+            <a:ext cx="1357744" cy="553998"/>
+          </a:xfrm>
+          <a:prstGeom prst="rect">
+            <a:avLst/>
+          </a:prstGeom>
+          <a:noFill/>
+        </p:spPr>
+        <p:txBody>
+          <a:bodyPr wrap="none" rtlCol="0">
+            <a:spAutoFit/>
+          </a:bodyPr>
+          <a:lstStyle/>
+          <a:p>
+            <a:r>
+              <a:rPr lang="en-US" dirty="0" err="1"/>
+              <a:t>event.deltaY</a:t>
+            </a:r>
+            <a:endParaRPr lang="en-US" dirty="0"/>
+          </a:p>
+          <a:p>
+            <a:r>
+              <a:rPr lang="en-US" sz="1200" dirty="0">
+                <a:solidFill>
+                  <a:schemeClr val="bg1">
+                    <a:lumMod val="50000"/>
+                  </a:schemeClr>
+                </a:solidFill>
+              </a:rPr>
+              <a:t>Double</a:t>
+            </a:r>
+            <a:endParaRPr lang="en-US" dirty="0"/>
+          </a:p>
+        </p:txBody>
+      </p:sp>
+    </p:spTree>
+    <p:extLst>
+      <p:ext uri="{BB962C8B-B14F-4D97-AF65-F5344CB8AC3E}">
+        <p14:creationId xmlns:p14="http://schemas.microsoft.com/office/powerpoint/2010/main" val="1852805844"/>
       </p:ext>
     </p:extLst>
   </p:cSld>

</xml_diff>